<commit_message>
nanoestructurados - lecture 10 added
</commit_message>
<xml_diff>
--- a/0.Miscellaneous/PPT_resources/pptTemplate.pptx
+++ b/0.Miscellaneous/PPT_resources/pptTemplate.pptx
@@ -178,7 +178,7 @@
 <file path=ppt/revisionInfo.xml><?xml version="1.0" encoding="utf-8"?>
 <p1510:revInfo xmlns:a="http://schemas.openxmlformats.org/drawingml/2006/main" xmlns:r="http://schemas.openxmlformats.org/officeDocument/2006/relationships" xmlns:p1510="http://schemas.microsoft.com/office/powerpoint/2015/10/main">
   <p1510:revLst>
-    <p1510:client id="{E8966260-3096-4054-A5E0-0A91A10A6CF4}" v="12" dt="2019-05-05T18:21:47.650"/>
+    <p1510:client id="{D962D6D7-454A-41C7-98A7-DA876A9E1509}" v="25" dt="2020-05-04T16:19:55.653"/>
   </p1510:revLst>
 </p1510:revInfo>
 </file>
@@ -446,86 +446,134 @@
     </pc:docChg>
   </pc:docChgLst>
   <pc:docChgLst>
-    <pc:chgData name="Antonio Osamu Katagiri Tanaka" userId="2c28225e-d492-4964-8551-1b0a3c65dda0" providerId="ADAL" clId="{C59DF1F7-432E-4893-B28C-5D3B004F8374}"/>
-    <pc:docChg chg="undo redo custSel addSld delSld modSld sldOrd delSection modSection">
-      <pc:chgData name="Antonio Osamu Katagiri Tanaka" userId="2c28225e-d492-4964-8551-1b0a3c65dda0" providerId="ADAL" clId="{C59DF1F7-432E-4893-B28C-5D3B004F8374}" dt="2019-03-31T14:59:20.878" v="389" actId="20577"/>
+    <pc:chgData name="Antonio Osamu Katagiri Tanaka" userId="2c28225e-d492-4964-8551-1b0a3c65dda0" providerId="ADAL" clId="{A1255C39-2EFB-4D15-B143-B65097792378}"/>
+    <pc:docChg chg="undo custSel addSld delSld modSld">
+      <pc:chgData name="Antonio Osamu Katagiri Tanaka" userId="2c28225e-d492-4964-8551-1b0a3c65dda0" providerId="ADAL" clId="{A1255C39-2EFB-4D15-B143-B65097792378}" dt="2019-03-29T13:16:25.522" v="350" actId="20577"/>
       <pc:docMkLst>
         <pc:docMk/>
       </pc:docMkLst>
       <pc:sldChg chg="modSp">
-        <pc:chgData name="Antonio Osamu Katagiri Tanaka" userId="2c28225e-d492-4964-8551-1b0a3c65dda0" providerId="ADAL" clId="{C59DF1F7-432E-4893-B28C-5D3B004F8374}" dt="2019-03-30T15:24:08.167" v="64" actId="1440"/>
+        <pc:chgData name="Antonio Osamu Katagiri Tanaka" userId="2c28225e-d492-4964-8551-1b0a3c65dda0" providerId="ADAL" clId="{A1255C39-2EFB-4D15-B143-B65097792378}" dt="2019-03-28T22:22:21.819" v="38" actId="20577"/>
+        <pc:sldMkLst>
+          <pc:docMk/>
+          <pc:sldMk cId="3401248549" sldId="256"/>
+        </pc:sldMkLst>
+        <pc:spChg chg="mod">
+          <ac:chgData name="Antonio Osamu Katagiri Tanaka" userId="2c28225e-d492-4964-8551-1b0a3c65dda0" providerId="ADAL" clId="{A1255C39-2EFB-4D15-B143-B65097792378}" dt="2019-03-28T22:22:21.819" v="38" actId="20577"/>
+          <ac:spMkLst>
+            <pc:docMk/>
+            <pc:sldMk cId="3401248549" sldId="256"/>
+            <ac:spMk id="7" creationId="{8D0BEDFD-CE79-4A45-9ADE-72FBEA303FCC}"/>
+          </ac:spMkLst>
+        </pc:spChg>
+      </pc:sldChg>
+      <pc:sldChg chg="modSp addCm delCm">
+        <pc:chgData name="Antonio Osamu Katagiri Tanaka" userId="2c28225e-d492-4964-8551-1b0a3c65dda0" providerId="ADAL" clId="{A1255C39-2EFB-4D15-B143-B65097792378}" dt="2019-03-29T13:16:25.522" v="350" actId="20577"/>
+        <pc:sldMkLst>
+          <pc:docMk/>
+          <pc:sldMk cId="1105756717" sldId="257"/>
+        </pc:sldMkLst>
+        <pc:spChg chg="mod">
+          <ac:chgData name="Antonio Osamu Katagiri Tanaka" userId="2c28225e-d492-4964-8551-1b0a3c65dda0" providerId="ADAL" clId="{A1255C39-2EFB-4D15-B143-B65097792378}" dt="2019-03-28T22:24:17.071" v="98" actId="790"/>
+          <ac:spMkLst>
+            <pc:docMk/>
+            <pc:sldMk cId="1105756717" sldId="257"/>
+            <ac:spMk id="2" creationId="{6B4CD107-D7DB-4A9B-AA15-4038D49BB7C0}"/>
+          </ac:spMkLst>
+        </pc:spChg>
+        <pc:spChg chg="mod">
+          <ac:chgData name="Antonio Osamu Katagiri Tanaka" userId="2c28225e-d492-4964-8551-1b0a3c65dda0" providerId="ADAL" clId="{A1255C39-2EFB-4D15-B143-B65097792378}" dt="2019-03-29T13:16:25.522" v="350" actId="20577"/>
+          <ac:spMkLst>
+            <pc:docMk/>
+            <pc:sldMk cId="1105756717" sldId="257"/>
+            <ac:spMk id="3" creationId="{6E971A9A-8031-4781-96A0-B9A5656935B5}"/>
+          </ac:spMkLst>
+        </pc:spChg>
+      </pc:sldChg>
+      <pc:sldChg chg="addSp delSp modSp">
+        <pc:chgData name="Antonio Osamu Katagiri Tanaka" userId="2c28225e-d492-4964-8551-1b0a3c65dda0" providerId="ADAL" clId="{A1255C39-2EFB-4D15-B143-B65097792378}" dt="2019-03-28T23:56:37.673" v="212" actId="113"/>
         <pc:sldMkLst>
           <pc:docMk/>
           <pc:sldMk cId="4056039362" sldId="260"/>
         </pc:sldMkLst>
-        <pc:picChg chg="mod">
-          <ac:chgData name="Antonio Osamu Katagiri Tanaka" userId="2c28225e-d492-4964-8551-1b0a3c65dda0" providerId="ADAL" clId="{C59DF1F7-432E-4893-B28C-5D3B004F8374}" dt="2019-03-30T15:24:08.167" v="64" actId="1440"/>
-          <ac:picMkLst>
+        <pc:spChg chg="del">
+          <ac:chgData name="Antonio Osamu Katagiri Tanaka" userId="2c28225e-d492-4964-8551-1b0a3c65dda0" providerId="ADAL" clId="{A1255C39-2EFB-4D15-B143-B65097792378}" dt="2019-03-28T23:48:09.150" v="129" actId="478"/>
+          <ac:spMkLst>
             <pc:docMk/>
             <pc:sldMk cId="4056039362" sldId="260"/>
-            <ac:picMk id="13" creationId="{8578D0BD-CD2C-44B1-976E-1029D186D2DF}"/>
-          </ac:picMkLst>
-        </pc:picChg>
-      </pc:sldChg>
-      <pc:sldChg chg="ord">
-        <pc:chgData name="Antonio Osamu Katagiri Tanaka" userId="2c28225e-d492-4964-8551-1b0a3c65dda0" providerId="ADAL" clId="{C59DF1F7-432E-4893-B28C-5D3B004F8374}" dt="2019-03-30T14:49:00.456" v="1"/>
-        <pc:sldMkLst>
-          <pc:docMk/>
-          <pc:sldMk cId="3604131991" sldId="263"/>
-        </pc:sldMkLst>
-      </pc:sldChg>
-      <pc:sldChg chg="addSp delSp modSp add">
-        <pc:chgData name="Antonio Osamu Katagiri Tanaka" userId="2c28225e-d492-4964-8551-1b0a3c65dda0" providerId="ADAL" clId="{C59DF1F7-432E-4893-B28C-5D3B004F8374}" dt="2019-03-30T15:01:17.755" v="32"/>
-        <pc:sldMkLst>
-          <pc:docMk/>
-          <pc:sldMk cId="4246728971" sldId="269"/>
-        </pc:sldMkLst>
-        <pc:spChg chg="add del mod">
-          <ac:chgData name="Antonio Osamu Katagiri Tanaka" userId="2c28225e-d492-4964-8551-1b0a3c65dda0" providerId="ADAL" clId="{C59DF1F7-432E-4893-B28C-5D3B004F8374}" dt="2019-03-30T14:52:53.260" v="6" actId="478"/>
-          <ac:spMkLst>
-            <pc:docMk/>
-            <pc:sldMk cId="4246728971" sldId="269"/>
-            <ac:spMk id="3" creationId="{BFCEFFC5-7335-4486-8818-2B397870E222}"/>
+            <ac:spMk id="2" creationId="{6B4CD107-D7DB-4A9B-AA15-4038D49BB7C0}"/>
           </ac:spMkLst>
         </pc:spChg>
         <pc:spChg chg="del">
-          <ac:chgData name="Antonio Osamu Katagiri Tanaka" userId="2c28225e-d492-4964-8551-1b0a3c65dda0" providerId="ADAL" clId="{C59DF1F7-432E-4893-B28C-5D3B004F8374}" dt="2019-03-30T14:52:51.721" v="5" actId="478"/>
+          <ac:chgData name="Antonio Osamu Katagiri Tanaka" userId="2c28225e-d492-4964-8551-1b0a3c65dda0" providerId="ADAL" clId="{A1255C39-2EFB-4D15-B143-B65097792378}" dt="2019-03-28T23:48:09.150" v="129" actId="478"/>
           <ac:spMkLst>
             <pc:docMk/>
-            <pc:sldMk cId="4246728971" sldId="269"/>
-            <ac:spMk id="4" creationId="{F9ED8BE6-F7AC-4FD8-8FA8-8C683A7C2F62}"/>
+            <pc:sldMk cId="4056039362" sldId="260"/>
+            <ac:spMk id="3" creationId="{6E971A9A-8031-4781-96A0-B9A5656935B5}"/>
           </ac:spMkLst>
         </pc:spChg>
-        <pc:spChg chg="del">
-          <ac:chgData name="Antonio Osamu Katagiri Tanaka" userId="2c28225e-d492-4964-8551-1b0a3c65dda0" providerId="ADAL" clId="{C59DF1F7-432E-4893-B28C-5D3B004F8374}" dt="2019-03-30T14:52:55.923" v="7" actId="478"/>
+        <pc:spChg chg="add mod">
+          <ac:chgData name="Antonio Osamu Katagiri Tanaka" userId="2c28225e-d492-4964-8551-1b0a3c65dda0" providerId="ADAL" clId="{A1255C39-2EFB-4D15-B143-B65097792378}" dt="2019-03-28T23:50:57.963" v="160" actId="14100"/>
           <ac:spMkLst>
             <pc:docMk/>
-            <pc:sldMk cId="4246728971" sldId="269"/>
-            <ac:spMk id="6" creationId="{058630E6-31AF-4451-B084-C9809D0DA4E8}"/>
+            <pc:sldMk cId="4056039362" sldId="260"/>
+            <ac:spMk id="6" creationId="{438892A2-F58C-479B-93B3-BDD2A80D348B}"/>
+          </ac:spMkLst>
+        </pc:spChg>
+        <pc:spChg chg="add del">
+          <ac:chgData name="Antonio Osamu Katagiri Tanaka" userId="2c28225e-d492-4964-8551-1b0a3c65dda0" providerId="ADAL" clId="{A1255C39-2EFB-4D15-B143-B65097792378}" dt="2019-03-28T23:48:28.310" v="146" actId="478"/>
+          <ac:spMkLst>
+            <pc:docMk/>
+            <pc:sldMk cId="4056039362" sldId="260"/>
+            <ac:spMk id="7" creationId="{EF6DB918-A567-432C-9553-B291EBCD9916}"/>
           </ac:spMkLst>
         </pc:spChg>
         <pc:spChg chg="add del mod">
-          <ac:chgData name="Antonio Osamu Katagiri Tanaka" userId="2c28225e-d492-4964-8551-1b0a3c65dda0" providerId="ADAL" clId="{C59DF1F7-432E-4893-B28C-5D3B004F8374}" dt="2019-03-30T14:52:58.396" v="8" actId="478"/>
+          <ac:chgData name="Antonio Osamu Katagiri Tanaka" userId="2c28225e-d492-4964-8551-1b0a3c65dda0" providerId="ADAL" clId="{A1255C39-2EFB-4D15-B143-B65097792378}" dt="2019-03-28T23:48:31.374" v="147" actId="478"/>
           <ac:spMkLst>
             <pc:docMk/>
-            <pc:sldMk cId="4246728971" sldId="269"/>
-            <ac:spMk id="7" creationId="{EFB1FD18-9FB8-4EC8-A186-B4E23A6745CA}"/>
+            <pc:sldMk cId="4056039362" sldId="260"/>
+            <ac:spMk id="9" creationId="{1E2B6CCF-ADC6-4398-BBBE-8A3899B1F60D}"/>
+          </ac:spMkLst>
+        </pc:spChg>
+        <pc:spChg chg="add del mod">
+          <ac:chgData name="Antonio Osamu Katagiri Tanaka" userId="2c28225e-d492-4964-8551-1b0a3c65dda0" providerId="ADAL" clId="{A1255C39-2EFB-4D15-B143-B65097792378}" dt="2019-03-28T23:49:31.279" v="152" actId="478"/>
+          <ac:spMkLst>
+            <pc:docMk/>
+            <pc:sldMk cId="4056039362" sldId="260"/>
+            <ac:spMk id="10" creationId="{76E5AA51-769F-464D-B9B3-B06DC2DB3974}"/>
+          </ac:spMkLst>
+        </pc:spChg>
+        <pc:spChg chg="add del mod">
+          <ac:chgData name="Antonio Osamu Katagiri Tanaka" userId="2c28225e-d492-4964-8551-1b0a3c65dda0" providerId="ADAL" clId="{A1255C39-2EFB-4D15-B143-B65097792378}" dt="2019-03-28T23:49:33.812" v="153" actId="478"/>
+          <ac:spMkLst>
+            <pc:docMk/>
+            <pc:sldMk cId="4056039362" sldId="260"/>
+            <ac:spMk id="12" creationId="{687A944B-A58D-42D4-A5FB-9C5AEDA23012}"/>
           </ac:spMkLst>
         </pc:spChg>
         <pc:spChg chg="add mod">
-          <ac:chgData name="Antonio Osamu Katagiri Tanaka" userId="2c28225e-d492-4964-8551-1b0a3c65dda0" providerId="ADAL" clId="{C59DF1F7-432E-4893-B28C-5D3B004F8374}" dt="2019-03-30T14:57:55.916" v="28" actId="403"/>
+          <ac:chgData name="Antonio Osamu Katagiri Tanaka" userId="2c28225e-d492-4964-8551-1b0a3c65dda0" providerId="ADAL" clId="{A1255C39-2EFB-4D15-B143-B65097792378}" dt="2019-03-28T23:56:37.673" v="212" actId="113"/>
           <ac:spMkLst>
             <pc:docMk/>
-            <pc:sldMk cId="4246728971" sldId="269"/>
-            <ac:spMk id="9" creationId="{907DD878-B76C-4FC5-9BC3-86C7C3DB3BDA}"/>
+            <pc:sldMk cId="4056039362" sldId="260"/>
+            <ac:spMk id="14" creationId="{B1FDEF3E-1872-41D3-A841-FBE14801F476}"/>
           </ac:spMkLst>
         </pc:spChg>
+        <pc:picChg chg="add del mod">
+          <ac:chgData name="Antonio Osamu Katagiri Tanaka" userId="2c28225e-d492-4964-8551-1b0a3c65dda0" providerId="ADAL" clId="{A1255C39-2EFB-4D15-B143-B65097792378}" dt="2019-03-28T23:50:01.886" v="156" actId="478"/>
+          <ac:picMkLst>
+            <pc:docMk/>
+            <pc:sldMk cId="4056039362" sldId="260"/>
+            <ac:picMk id="5" creationId="{977539DB-7CD6-458F-9C2E-830FC458ECDD}"/>
+          </ac:picMkLst>
+        </pc:picChg>
         <pc:picChg chg="add mod">
-          <ac:chgData name="Antonio Osamu Katagiri Tanaka" userId="2c28225e-d492-4964-8551-1b0a3c65dda0" providerId="ADAL" clId="{C59DF1F7-432E-4893-B28C-5D3B004F8374}" dt="2019-03-30T15:01:17.755" v="32"/>
+          <ac:chgData name="Antonio Osamu Katagiri Tanaka" userId="2c28225e-d492-4964-8551-1b0a3c65dda0" providerId="ADAL" clId="{A1255C39-2EFB-4D15-B143-B65097792378}" dt="2019-03-28T23:53:58.543" v="189" actId="1036"/>
           <ac:picMkLst>
             <pc:docMk/>
-            <pc:sldMk cId="4246728971" sldId="269"/>
-            <ac:picMk id="1026" creationId="{62C86081-2859-45C8-BAE6-D2CC488FFFF6}"/>
+            <pc:sldMk cId="4056039362" sldId="260"/>
+            <ac:picMk id="13" creationId="{8578D0BD-CD2C-44B1-976E-1029D186D2DF}"/>
           </ac:picMkLst>
         </pc:picChg>
       </pc:sldChg>
@@ -789,6 +837,92 @@
     </pc:docChg>
   </pc:docChgLst>
   <pc:docChgLst>
+    <pc:chgData name="Antonio Osamu Katagiri Tanaka" userId="2c28225e-d492-4964-8551-1b0a3c65dda0" providerId="ADAL" clId="{C59DF1F7-432E-4893-B28C-5D3B004F8374}"/>
+    <pc:docChg chg="undo redo custSel addSld delSld modSld sldOrd delSection modSection">
+      <pc:chgData name="Antonio Osamu Katagiri Tanaka" userId="2c28225e-d492-4964-8551-1b0a3c65dda0" providerId="ADAL" clId="{C59DF1F7-432E-4893-B28C-5D3B004F8374}" dt="2019-03-31T14:59:20.878" v="389" actId="20577"/>
+      <pc:docMkLst>
+        <pc:docMk/>
+      </pc:docMkLst>
+      <pc:sldChg chg="modSp">
+        <pc:chgData name="Antonio Osamu Katagiri Tanaka" userId="2c28225e-d492-4964-8551-1b0a3c65dda0" providerId="ADAL" clId="{C59DF1F7-432E-4893-B28C-5D3B004F8374}" dt="2019-03-30T15:24:08.167" v="64" actId="1440"/>
+        <pc:sldMkLst>
+          <pc:docMk/>
+          <pc:sldMk cId="4056039362" sldId="260"/>
+        </pc:sldMkLst>
+        <pc:picChg chg="mod">
+          <ac:chgData name="Antonio Osamu Katagiri Tanaka" userId="2c28225e-d492-4964-8551-1b0a3c65dda0" providerId="ADAL" clId="{C59DF1F7-432E-4893-B28C-5D3B004F8374}" dt="2019-03-30T15:24:08.167" v="64" actId="1440"/>
+          <ac:picMkLst>
+            <pc:docMk/>
+            <pc:sldMk cId="4056039362" sldId="260"/>
+            <ac:picMk id="13" creationId="{8578D0BD-CD2C-44B1-976E-1029D186D2DF}"/>
+          </ac:picMkLst>
+        </pc:picChg>
+      </pc:sldChg>
+      <pc:sldChg chg="ord">
+        <pc:chgData name="Antonio Osamu Katagiri Tanaka" userId="2c28225e-d492-4964-8551-1b0a3c65dda0" providerId="ADAL" clId="{C59DF1F7-432E-4893-B28C-5D3B004F8374}" dt="2019-03-30T14:49:00.456" v="1"/>
+        <pc:sldMkLst>
+          <pc:docMk/>
+          <pc:sldMk cId="3604131991" sldId="263"/>
+        </pc:sldMkLst>
+      </pc:sldChg>
+      <pc:sldChg chg="addSp delSp modSp add">
+        <pc:chgData name="Antonio Osamu Katagiri Tanaka" userId="2c28225e-d492-4964-8551-1b0a3c65dda0" providerId="ADAL" clId="{C59DF1F7-432E-4893-B28C-5D3B004F8374}" dt="2019-03-30T15:01:17.755" v="32"/>
+        <pc:sldMkLst>
+          <pc:docMk/>
+          <pc:sldMk cId="4246728971" sldId="269"/>
+        </pc:sldMkLst>
+        <pc:spChg chg="add del mod">
+          <ac:chgData name="Antonio Osamu Katagiri Tanaka" userId="2c28225e-d492-4964-8551-1b0a3c65dda0" providerId="ADAL" clId="{C59DF1F7-432E-4893-B28C-5D3B004F8374}" dt="2019-03-30T14:52:53.260" v="6" actId="478"/>
+          <ac:spMkLst>
+            <pc:docMk/>
+            <pc:sldMk cId="4246728971" sldId="269"/>
+            <ac:spMk id="3" creationId="{BFCEFFC5-7335-4486-8818-2B397870E222}"/>
+          </ac:spMkLst>
+        </pc:spChg>
+        <pc:spChg chg="del">
+          <ac:chgData name="Antonio Osamu Katagiri Tanaka" userId="2c28225e-d492-4964-8551-1b0a3c65dda0" providerId="ADAL" clId="{C59DF1F7-432E-4893-B28C-5D3B004F8374}" dt="2019-03-30T14:52:51.721" v="5" actId="478"/>
+          <ac:spMkLst>
+            <pc:docMk/>
+            <pc:sldMk cId="4246728971" sldId="269"/>
+            <ac:spMk id="4" creationId="{F9ED8BE6-F7AC-4FD8-8FA8-8C683A7C2F62}"/>
+          </ac:spMkLst>
+        </pc:spChg>
+        <pc:spChg chg="del">
+          <ac:chgData name="Antonio Osamu Katagiri Tanaka" userId="2c28225e-d492-4964-8551-1b0a3c65dda0" providerId="ADAL" clId="{C59DF1F7-432E-4893-B28C-5D3B004F8374}" dt="2019-03-30T14:52:55.923" v="7" actId="478"/>
+          <ac:spMkLst>
+            <pc:docMk/>
+            <pc:sldMk cId="4246728971" sldId="269"/>
+            <ac:spMk id="6" creationId="{058630E6-31AF-4451-B084-C9809D0DA4E8}"/>
+          </ac:spMkLst>
+        </pc:spChg>
+        <pc:spChg chg="add del mod">
+          <ac:chgData name="Antonio Osamu Katagiri Tanaka" userId="2c28225e-d492-4964-8551-1b0a3c65dda0" providerId="ADAL" clId="{C59DF1F7-432E-4893-B28C-5D3B004F8374}" dt="2019-03-30T14:52:58.396" v="8" actId="478"/>
+          <ac:spMkLst>
+            <pc:docMk/>
+            <pc:sldMk cId="4246728971" sldId="269"/>
+            <ac:spMk id="7" creationId="{EFB1FD18-9FB8-4EC8-A186-B4E23A6745CA}"/>
+          </ac:spMkLst>
+        </pc:spChg>
+        <pc:spChg chg="add mod">
+          <ac:chgData name="Antonio Osamu Katagiri Tanaka" userId="2c28225e-d492-4964-8551-1b0a3c65dda0" providerId="ADAL" clId="{C59DF1F7-432E-4893-B28C-5D3B004F8374}" dt="2019-03-30T14:57:55.916" v="28" actId="403"/>
+          <ac:spMkLst>
+            <pc:docMk/>
+            <pc:sldMk cId="4246728971" sldId="269"/>
+            <ac:spMk id="9" creationId="{907DD878-B76C-4FC5-9BC3-86C7C3DB3BDA}"/>
+          </ac:spMkLst>
+        </pc:spChg>
+        <pc:picChg chg="add mod">
+          <ac:chgData name="Antonio Osamu Katagiri Tanaka" userId="2c28225e-d492-4964-8551-1b0a3c65dda0" providerId="ADAL" clId="{C59DF1F7-432E-4893-B28C-5D3B004F8374}" dt="2019-03-30T15:01:17.755" v="32"/>
+          <ac:picMkLst>
+            <pc:docMk/>
+            <pc:sldMk cId="4246728971" sldId="269"/>
+            <ac:picMk id="1026" creationId="{62C86081-2859-45C8-BAE6-D2CC488FFFF6}"/>
+          </ac:picMkLst>
+        </pc:picChg>
+      </pc:sldChg>
+    </pc:docChg>
+  </pc:docChgLst>
+  <pc:docChgLst>
     <pc:chgData name="Antonio Osamu Katagiri Tanaka" userId="2c28225e-d492-4964-8551-1b0a3c65dda0" providerId="ADAL" clId="{BA091A27-582A-4D6D-8346-D5CF8624059C}"/>
     <pc:docChg chg="undo custSel addSld delSld modSld sldOrd">
       <pc:chgData name="Antonio Osamu Katagiri Tanaka" userId="2c28225e-d492-4964-8551-1b0a3c65dda0" providerId="ADAL" clId="{BA091A27-582A-4D6D-8346-D5CF8624059C}" dt="2019-03-29T18:11:35.461" v="1535" actId="20577"/>
@@ -836,20 +970,28 @@
     </pc:docChg>
   </pc:docChgLst>
   <pc:docChgLst>
-    <pc:chgData name="Antonio Osamu Katagiri Tanaka" userId="2c28225e-d492-4964-8551-1b0a3c65dda0" providerId="ADAL" clId="{A1255C39-2EFB-4D15-B143-B65097792378}"/>
-    <pc:docChg chg="undo custSel addSld delSld modSld">
-      <pc:chgData name="Antonio Osamu Katagiri Tanaka" userId="2c28225e-d492-4964-8551-1b0a3c65dda0" providerId="ADAL" clId="{A1255C39-2EFB-4D15-B143-B65097792378}" dt="2019-03-29T13:16:25.522" v="350" actId="20577"/>
+    <pc:chgData name="Antonio Osamu Katagiri Tanaka" userId="2c28225e-d492-4964-8551-1b0a3c65dda0" providerId="ADAL" clId="{D962D6D7-454A-41C7-98A7-DA876A9E1509}"/>
+    <pc:docChg chg="undo custSel modSld modMainMaster">
+      <pc:chgData name="Antonio Osamu Katagiri Tanaka" userId="2c28225e-d492-4964-8551-1b0a3c65dda0" providerId="ADAL" clId="{D962D6D7-454A-41C7-98A7-DA876A9E1509}" dt="2020-05-04T16:19:55.243" v="80" actId="20577"/>
       <pc:docMkLst>
         <pc:docMk/>
       </pc:docMkLst>
-      <pc:sldChg chg="modSp">
-        <pc:chgData name="Antonio Osamu Katagiri Tanaka" userId="2c28225e-d492-4964-8551-1b0a3c65dda0" providerId="ADAL" clId="{A1255C39-2EFB-4D15-B143-B65097792378}" dt="2019-03-28T22:22:21.819" v="38" actId="20577"/>
+      <pc:sldChg chg="modSp mod setBg">
+        <pc:chgData name="Antonio Osamu Katagiri Tanaka" userId="2c28225e-d492-4964-8551-1b0a3c65dda0" providerId="ADAL" clId="{D962D6D7-454A-41C7-98A7-DA876A9E1509}" dt="2020-05-04T16:19:55.243" v="80" actId="20577"/>
         <pc:sldMkLst>
           <pc:docMk/>
           <pc:sldMk cId="3401248549" sldId="256"/>
         </pc:sldMkLst>
         <pc:spChg chg="mod">
-          <ac:chgData name="Antonio Osamu Katagiri Tanaka" userId="2c28225e-d492-4964-8551-1b0a3c65dda0" providerId="ADAL" clId="{A1255C39-2EFB-4D15-B143-B65097792378}" dt="2019-03-28T22:22:21.819" v="38" actId="20577"/>
+          <ac:chgData name="Antonio Osamu Katagiri Tanaka" userId="2c28225e-d492-4964-8551-1b0a3c65dda0" providerId="ADAL" clId="{D962D6D7-454A-41C7-98A7-DA876A9E1509}" dt="2020-05-04T16:19:15.301" v="26"/>
+          <ac:spMkLst>
+            <pc:docMk/>
+            <pc:sldMk cId="3401248549" sldId="256"/>
+            <ac:spMk id="6" creationId="{3EB028BF-0783-48AF-AB96-57CC5B2CBEAF}"/>
+          </ac:spMkLst>
+        </pc:spChg>
+        <pc:spChg chg="mod">
+          <ac:chgData name="Antonio Osamu Katagiri Tanaka" userId="2c28225e-d492-4964-8551-1b0a3c65dda0" providerId="ADAL" clId="{D962D6D7-454A-41C7-98A7-DA876A9E1509}" dt="2020-05-04T16:19:55.243" v="80" actId="20577"/>
           <ac:spMkLst>
             <pc:docMk/>
             <pc:sldMk cId="3401248549" sldId="256"/>
@@ -857,116 +999,156 @@
           </ac:spMkLst>
         </pc:spChg>
       </pc:sldChg>
-      <pc:sldChg chg="modSp addCm delCm">
-        <pc:chgData name="Antonio Osamu Katagiri Tanaka" userId="2c28225e-d492-4964-8551-1b0a3c65dda0" providerId="ADAL" clId="{A1255C39-2EFB-4D15-B143-B65097792378}" dt="2019-03-29T13:16:25.522" v="350" actId="20577"/>
+      <pc:sldChg chg="addSp delSp modSp mod">
+        <pc:chgData name="Antonio Osamu Katagiri Tanaka" userId="2c28225e-d492-4964-8551-1b0a3c65dda0" providerId="ADAL" clId="{D962D6D7-454A-41C7-98A7-DA876A9E1509}" dt="2020-05-04T16:18:34.715" v="25" actId="14100"/>
         <pc:sldMkLst>
           <pc:docMk/>
-          <pc:sldMk cId="1105756717" sldId="257"/>
+          <pc:sldMk cId="4246728971" sldId="269"/>
         </pc:sldMkLst>
-        <pc:spChg chg="mod">
-          <ac:chgData name="Antonio Osamu Katagiri Tanaka" userId="2c28225e-d492-4964-8551-1b0a3c65dda0" providerId="ADAL" clId="{A1255C39-2EFB-4D15-B143-B65097792378}" dt="2019-03-28T22:24:17.071" v="98" actId="790"/>
+        <pc:spChg chg="add">
+          <ac:chgData name="Antonio Osamu Katagiri Tanaka" userId="2c28225e-d492-4964-8551-1b0a3c65dda0" providerId="ADAL" clId="{D962D6D7-454A-41C7-98A7-DA876A9E1509}" dt="2020-05-04T16:15:48.760" v="11"/>
           <ac:spMkLst>
             <pc:docMk/>
-            <pc:sldMk cId="1105756717" sldId="257"/>
-            <ac:spMk id="2" creationId="{6B4CD107-D7DB-4A9B-AA15-4038D49BB7C0}"/>
+            <pc:sldMk cId="4246728971" sldId="269"/>
+            <ac:spMk id="3" creationId="{2D3FFEBE-5388-4A46-A0AF-9ADC5456286E}"/>
           </ac:spMkLst>
         </pc:spChg>
-        <pc:spChg chg="mod">
-          <ac:chgData name="Antonio Osamu Katagiri Tanaka" userId="2c28225e-d492-4964-8551-1b0a3c65dda0" providerId="ADAL" clId="{A1255C39-2EFB-4D15-B143-B65097792378}" dt="2019-03-29T13:16:25.522" v="350" actId="20577"/>
+        <pc:spChg chg="add del mod">
+          <ac:chgData name="Antonio Osamu Katagiri Tanaka" userId="2c28225e-d492-4964-8551-1b0a3c65dda0" providerId="ADAL" clId="{D962D6D7-454A-41C7-98A7-DA876A9E1509}" dt="2020-05-04T16:16:04.485" v="15" actId="478"/>
           <ac:spMkLst>
             <pc:docMk/>
-            <pc:sldMk cId="1105756717" sldId="257"/>
-            <ac:spMk id="3" creationId="{6E971A9A-8031-4781-96A0-B9A5656935B5}"/>
-          </ac:spMkLst>
-        </pc:spChg>
-      </pc:sldChg>
-      <pc:sldChg chg="addSp delSp modSp">
-        <pc:chgData name="Antonio Osamu Katagiri Tanaka" userId="2c28225e-d492-4964-8551-1b0a3c65dda0" providerId="ADAL" clId="{A1255C39-2EFB-4D15-B143-B65097792378}" dt="2019-03-28T23:56:37.673" v="212" actId="113"/>
-        <pc:sldMkLst>
-          <pc:docMk/>
-          <pc:sldMk cId="4056039362" sldId="260"/>
-        </pc:sldMkLst>
-        <pc:spChg chg="del">
-          <ac:chgData name="Antonio Osamu Katagiri Tanaka" userId="2c28225e-d492-4964-8551-1b0a3c65dda0" providerId="ADAL" clId="{A1255C39-2EFB-4D15-B143-B65097792378}" dt="2019-03-28T23:48:09.150" v="129" actId="478"/>
-          <ac:spMkLst>
-            <pc:docMk/>
-            <pc:sldMk cId="4056039362" sldId="260"/>
-            <ac:spMk id="2" creationId="{6B4CD107-D7DB-4A9B-AA15-4038D49BB7C0}"/>
+            <pc:sldMk cId="4246728971" sldId="269"/>
+            <ac:spMk id="5" creationId="{446ACE21-741E-4F2C-859F-FBC573402619}"/>
           </ac:spMkLst>
         </pc:spChg>
         <pc:spChg chg="del">
-          <ac:chgData name="Antonio Osamu Katagiri Tanaka" userId="2c28225e-d492-4964-8551-1b0a3c65dda0" providerId="ADAL" clId="{A1255C39-2EFB-4D15-B143-B65097792378}" dt="2019-03-28T23:48:09.150" v="129" actId="478"/>
+          <ac:chgData name="Antonio Osamu Katagiri Tanaka" userId="2c28225e-d492-4964-8551-1b0a3c65dda0" providerId="ADAL" clId="{D962D6D7-454A-41C7-98A7-DA876A9E1509}" dt="2020-05-04T16:16:01.539" v="13" actId="478"/>
           <ac:spMkLst>
             <pc:docMk/>
-            <pc:sldMk cId="4056039362" sldId="260"/>
-            <ac:spMk id="3" creationId="{6E971A9A-8031-4781-96A0-B9A5656935B5}"/>
+            <pc:sldMk cId="4246728971" sldId="269"/>
+            <ac:spMk id="9" creationId="{907DD878-B76C-4FC5-9BC3-86C7C3DB3BDA}"/>
           </ac:spMkLst>
         </pc:spChg>
-        <pc:spChg chg="add mod">
-          <ac:chgData name="Antonio Osamu Katagiri Tanaka" userId="2c28225e-d492-4964-8551-1b0a3c65dda0" providerId="ADAL" clId="{A1255C39-2EFB-4D15-B143-B65097792378}" dt="2019-03-28T23:50:57.963" v="160" actId="14100"/>
-          <ac:spMkLst>
-            <pc:docMk/>
-            <pc:sldMk cId="4056039362" sldId="260"/>
-            <ac:spMk id="6" creationId="{438892A2-F58C-479B-93B3-BDD2A80D348B}"/>
-          </ac:spMkLst>
-        </pc:spChg>
-        <pc:spChg chg="add del">
-          <ac:chgData name="Antonio Osamu Katagiri Tanaka" userId="2c28225e-d492-4964-8551-1b0a3c65dda0" providerId="ADAL" clId="{A1255C39-2EFB-4D15-B143-B65097792378}" dt="2019-03-28T23:48:28.310" v="146" actId="478"/>
-          <ac:spMkLst>
-            <pc:docMk/>
-            <pc:sldMk cId="4056039362" sldId="260"/>
-            <ac:spMk id="7" creationId="{EF6DB918-A567-432C-9553-B291EBCD9916}"/>
-          </ac:spMkLst>
-        </pc:spChg>
-        <pc:spChg chg="add del mod">
-          <ac:chgData name="Antonio Osamu Katagiri Tanaka" userId="2c28225e-d492-4964-8551-1b0a3c65dda0" providerId="ADAL" clId="{A1255C39-2EFB-4D15-B143-B65097792378}" dt="2019-03-28T23:48:31.374" v="147" actId="478"/>
-          <ac:spMkLst>
-            <pc:docMk/>
-            <pc:sldMk cId="4056039362" sldId="260"/>
-            <ac:spMk id="9" creationId="{1E2B6CCF-ADC6-4398-BBBE-8A3899B1F60D}"/>
-          </ac:spMkLst>
-        </pc:spChg>
-        <pc:spChg chg="add del mod">
-          <ac:chgData name="Antonio Osamu Katagiri Tanaka" userId="2c28225e-d492-4964-8551-1b0a3c65dda0" providerId="ADAL" clId="{A1255C39-2EFB-4D15-B143-B65097792378}" dt="2019-03-28T23:49:31.279" v="152" actId="478"/>
-          <ac:spMkLst>
-            <pc:docMk/>
-            <pc:sldMk cId="4056039362" sldId="260"/>
-            <ac:spMk id="10" creationId="{76E5AA51-769F-464D-B9B3-B06DC2DB3974}"/>
-          </ac:spMkLst>
-        </pc:spChg>
-        <pc:spChg chg="add del mod">
-          <ac:chgData name="Antonio Osamu Katagiri Tanaka" userId="2c28225e-d492-4964-8551-1b0a3c65dda0" providerId="ADAL" clId="{A1255C39-2EFB-4D15-B143-B65097792378}" dt="2019-03-28T23:49:33.812" v="153" actId="478"/>
-          <ac:spMkLst>
-            <pc:docMk/>
-            <pc:sldMk cId="4056039362" sldId="260"/>
-            <ac:spMk id="12" creationId="{687A944B-A58D-42D4-A5FB-9C5AEDA23012}"/>
-          </ac:spMkLst>
-        </pc:spChg>
-        <pc:spChg chg="add mod">
-          <ac:chgData name="Antonio Osamu Katagiri Tanaka" userId="2c28225e-d492-4964-8551-1b0a3c65dda0" providerId="ADAL" clId="{A1255C39-2EFB-4D15-B143-B65097792378}" dt="2019-03-28T23:56:37.673" v="212" actId="113"/>
-          <ac:spMkLst>
-            <pc:docMk/>
-            <pc:sldMk cId="4056039362" sldId="260"/>
-            <ac:spMk id="14" creationId="{B1FDEF3E-1872-41D3-A841-FBE14801F476}"/>
-          </ac:spMkLst>
-        </pc:spChg>
+        <pc:picChg chg="del">
+          <ac:chgData name="Antonio Osamu Katagiri Tanaka" userId="2c28225e-d492-4964-8551-1b0a3c65dda0" providerId="ADAL" clId="{D962D6D7-454A-41C7-98A7-DA876A9E1509}" dt="2020-05-04T16:15:56.157" v="12" actId="478"/>
+          <ac:picMkLst>
+            <pc:docMk/>
+            <pc:sldMk cId="4246728971" sldId="269"/>
+            <ac:picMk id="2" creationId="{A3958ADD-11D2-4A36-B683-42F04B78B769}"/>
+          </ac:picMkLst>
+        </pc:picChg>
         <pc:picChg chg="add del mod">
-          <ac:chgData name="Antonio Osamu Katagiri Tanaka" userId="2c28225e-d492-4964-8551-1b0a3c65dda0" providerId="ADAL" clId="{A1255C39-2EFB-4D15-B143-B65097792378}" dt="2019-03-28T23:50:01.886" v="156" actId="478"/>
+          <ac:chgData name="Antonio Osamu Katagiri Tanaka" userId="2c28225e-d492-4964-8551-1b0a3c65dda0" providerId="ADAL" clId="{D962D6D7-454A-41C7-98A7-DA876A9E1509}" dt="2020-05-04T16:18:02.926" v="21" actId="478"/>
           <ac:picMkLst>
             <pc:docMk/>
-            <pc:sldMk cId="4056039362" sldId="260"/>
-            <ac:picMk id="5" creationId="{977539DB-7CD6-458F-9C2E-830FC458ECDD}"/>
+            <pc:sldMk cId="4246728971" sldId="269"/>
+            <ac:picMk id="1028" creationId="{56C6D4DC-57F2-4C12-81BE-8CDB47C96E4B}"/>
           </ac:picMkLst>
         </pc:picChg>
         <pc:picChg chg="add mod">
-          <ac:chgData name="Antonio Osamu Katagiri Tanaka" userId="2c28225e-d492-4964-8551-1b0a3c65dda0" providerId="ADAL" clId="{A1255C39-2EFB-4D15-B143-B65097792378}" dt="2019-03-28T23:53:58.543" v="189" actId="1036"/>
+          <ac:chgData name="Antonio Osamu Katagiri Tanaka" userId="2c28225e-d492-4964-8551-1b0a3c65dda0" providerId="ADAL" clId="{D962D6D7-454A-41C7-98A7-DA876A9E1509}" dt="2020-05-04T16:18:34.715" v="25" actId="14100"/>
           <ac:picMkLst>
             <pc:docMk/>
-            <pc:sldMk cId="4056039362" sldId="260"/>
-            <ac:picMk id="13" creationId="{8578D0BD-CD2C-44B1-976E-1029D186D2DF}"/>
+            <pc:sldMk cId="4246728971" sldId="269"/>
+            <ac:picMk id="1030" creationId="{DF3B20E7-DFB7-496B-A1B1-F29CEEFDF57F}"/>
           </ac:picMkLst>
         </pc:picChg>
       </pc:sldChg>
+      <pc:sldMasterChg chg="setBg modSldLayout">
+        <pc:chgData name="Antonio Osamu Katagiri Tanaka" userId="2c28225e-d492-4964-8551-1b0a3c65dda0" providerId="ADAL" clId="{D962D6D7-454A-41C7-98A7-DA876A9E1509}" dt="2020-05-04T16:10:55.133" v="8"/>
+        <pc:sldMasterMkLst>
+          <pc:docMk/>
+          <pc:sldMasterMk cId="2403102699" sldId="2147483648"/>
+        </pc:sldMasterMkLst>
+        <pc:sldLayoutChg chg="setBg">
+          <pc:chgData name="Antonio Osamu Katagiri Tanaka" userId="2c28225e-d492-4964-8551-1b0a3c65dda0" providerId="ADAL" clId="{D962D6D7-454A-41C7-98A7-DA876A9E1509}" dt="2020-05-04T16:10:55.133" v="8"/>
+          <pc:sldLayoutMkLst>
+            <pc:docMk/>
+            <pc:sldMasterMk cId="2403102699" sldId="2147483648"/>
+            <pc:sldLayoutMk cId="4257312655" sldId="2147483649"/>
+          </pc:sldLayoutMkLst>
+        </pc:sldLayoutChg>
+        <pc:sldLayoutChg chg="setBg">
+          <pc:chgData name="Antonio Osamu Katagiri Tanaka" userId="2c28225e-d492-4964-8551-1b0a3c65dda0" providerId="ADAL" clId="{D962D6D7-454A-41C7-98A7-DA876A9E1509}" dt="2020-05-04T16:10:55.133" v="8"/>
+          <pc:sldLayoutMkLst>
+            <pc:docMk/>
+            <pc:sldMasterMk cId="2403102699" sldId="2147483648"/>
+            <pc:sldLayoutMk cId="473447723" sldId="2147483650"/>
+          </pc:sldLayoutMkLst>
+        </pc:sldLayoutChg>
+        <pc:sldLayoutChg chg="setBg">
+          <pc:chgData name="Antonio Osamu Katagiri Tanaka" userId="2c28225e-d492-4964-8551-1b0a3c65dda0" providerId="ADAL" clId="{D962D6D7-454A-41C7-98A7-DA876A9E1509}" dt="2020-05-04T16:10:55.133" v="8"/>
+          <pc:sldLayoutMkLst>
+            <pc:docMk/>
+            <pc:sldMasterMk cId="2403102699" sldId="2147483648"/>
+            <pc:sldLayoutMk cId="1765815900" sldId="2147483651"/>
+          </pc:sldLayoutMkLst>
+        </pc:sldLayoutChg>
+        <pc:sldLayoutChg chg="setBg">
+          <pc:chgData name="Antonio Osamu Katagiri Tanaka" userId="2c28225e-d492-4964-8551-1b0a3c65dda0" providerId="ADAL" clId="{D962D6D7-454A-41C7-98A7-DA876A9E1509}" dt="2020-05-04T16:10:55.133" v="8"/>
+          <pc:sldLayoutMkLst>
+            <pc:docMk/>
+            <pc:sldMasterMk cId="2403102699" sldId="2147483648"/>
+            <pc:sldLayoutMk cId="1787570629" sldId="2147483652"/>
+          </pc:sldLayoutMkLst>
+        </pc:sldLayoutChg>
+        <pc:sldLayoutChg chg="setBg">
+          <pc:chgData name="Antonio Osamu Katagiri Tanaka" userId="2c28225e-d492-4964-8551-1b0a3c65dda0" providerId="ADAL" clId="{D962D6D7-454A-41C7-98A7-DA876A9E1509}" dt="2020-05-04T16:10:55.133" v="8"/>
+          <pc:sldLayoutMkLst>
+            <pc:docMk/>
+            <pc:sldMasterMk cId="2403102699" sldId="2147483648"/>
+            <pc:sldLayoutMk cId="1223017044" sldId="2147483653"/>
+          </pc:sldLayoutMkLst>
+        </pc:sldLayoutChg>
+        <pc:sldLayoutChg chg="setBg">
+          <pc:chgData name="Antonio Osamu Katagiri Tanaka" userId="2c28225e-d492-4964-8551-1b0a3c65dda0" providerId="ADAL" clId="{D962D6D7-454A-41C7-98A7-DA876A9E1509}" dt="2020-05-04T16:10:55.133" v="8"/>
+          <pc:sldLayoutMkLst>
+            <pc:docMk/>
+            <pc:sldMasterMk cId="2403102699" sldId="2147483648"/>
+            <pc:sldLayoutMk cId="2844546723" sldId="2147483654"/>
+          </pc:sldLayoutMkLst>
+        </pc:sldLayoutChg>
+        <pc:sldLayoutChg chg="setBg">
+          <pc:chgData name="Antonio Osamu Katagiri Tanaka" userId="2c28225e-d492-4964-8551-1b0a3c65dda0" providerId="ADAL" clId="{D962D6D7-454A-41C7-98A7-DA876A9E1509}" dt="2020-05-04T16:10:55.133" v="8"/>
+          <pc:sldLayoutMkLst>
+            <pc:docMk/>
+            <pc:sldMasterMk cId="2403102699" sldId="2147483648"/>
+            <pc:sldLayoutMk cId="2251026656" sldId="2147483655"/>
+          </pc:sldLayoutMkLst>
+        </pc:sldLayoutChg>
+        <pc:sldLayoutChg chg="setBg">
+          <pc:chgData name="Antonio Osamu Katagiri Tanaka" userId="2c28225e-d492-4964-8551-1b0a3c65dda0" providerId="ADAL" clId="{D962D6D7-454A-41C7-98A7-DA876A9E1509}" dt="2020-05-04T16:10:55.133" v="8"/>
+          <pc:sldLayoutMkLst>
+            <pc:docMk/>
+            <pc:sldMasterMk cId="2403102699" sldId="2147483648"/>
+            <pc:sldLayoutMk cId="49165472" sldId="2147483656"/>
+          </pc:sldLayoutMkLst>
+        </pc:sldLayoutChg>
+        <pc:sldLayoutChg chg="setBg">
+          <pc:chgData name="Antonio Osamu Katagiri Tanaka" userId="2c28225e-d492-4964-8551-1b0a3c65dda0" providerId="ADAL" clId="{D962D6D7-454A-41C7-98A7-DA876A9E1509}" dt="2020-05-04T16:10:55.133" v="8"/>
+          <pc:sldLayoutMkLst>
+            <pc:docMk/>
+            <pc:sldMasterMk cId="2403102699" sldId="2147483648"/>
+            <pc:sldLayoutMk cId="521446591" sldId="2147483657"/>
+          </pc:sldLayoutMkLst>
+        </pc:sldLayoutChg>
+        <pc:sldLayoutChg chg="setBg">
+          <pc:chgData name="Antonio Osamu Katagiri Tanaka" userId="2c28225e-d492-4964-8551-1b0a3c65dda0" providerId="ADAL" clId="{D962D6D7-454A-41C7-98A7-DA876A9E1509}" dt="2020-05-04T16:10:55.133" v="8"/>
+          <pc:sldLayoutMkLst>
+            <pc:docMk/>
+            <pc:sldMasterMk cId="2403102699" sldId="2147483648"/>
+            <pc:sldLayoutMk cId="653133263" sldId="2147483658"/>
+          </pc:sldLayoutMkLst>
+        </pc:sldLayoutChg>
+        <pc:sldLayoutChg chg="setBg">
+          <pc:chgData name="Antonio Osamu Katagiri Tanaka" userId="2c28225e-d492-4964-8551-1b0a3c65dda0" providerId="ADAL" clId="{D962D6D7-454A-41C7-98A7-DA876A9E1509}" dt="2020-05-04T16:10:55.133" v="8"/>
+          <pc:sldLayoutMkLst>
+            <pc:docMk/>
+            <pc:sldMasterMk cId="2403102699" sldId="2147483648"/>
+            <pc:sldLayoutMk cId="3334238241" sldId="2147483659"/>
+          </pc:sldLayoutMkLst>
+        </pc:sldLayoutChg>
+      </pc:sldMasterChg>
     </pc:docChg>
   </pc:docChgLst>
 </pc:chgInfo>
@@ -1116,7 +1298,7 @@
           <a:p>
             <a:fld id="{1B402B64-CAC4-4D07-834F-F232921309C8}" type="datetimeFigureOut">
               <a:rPr lang="en-GB" smtClean="0"/>
-              <a:t>02/10/2019</a:t>
+              <a:t>04/05/2020</a:t>
             </a:fld>
             <a:endParaRPr lang="en-GB"/>
           </a:p>
@@ -1624,7 +1806,7 @@
           <a:p>
             <a:fld id="{D884633D-11AC-4888-94B9-297E606567D1}" type="datetimeFigureOut">
               <a:rPr lang="en-GB" smtClean="0"/>
-              <a:t>02/10/2019</a:t>
+              <a:t>04/05/2020</a:t>
             </a:fld>
             <a:endParaRPr lang="en-GB"/>
           </a:p>
@@ -1824,7 +2006,7 @@
           <a:p>
             <a:fld id="{D884633D-11AC-4888-94B9-297E606567D1}" type="datetimeFigureOut">
               <a:rPr lang="en-GB" smtClean="0"/>
-              <a:t>02/10/2019</a:t>
+              <a:t>04/05/2020</a:t>
             </a:fld>
             <a:endParaRPr lang="en-GB"/>
           </a:p>
@@ -2034,7 +2216,7 @@
           <a:p>
             <a:fld id="{D884633D-11AC-4888-94B9-297E606567D1}" type="datetimeFigureOut">
               <a:rPr lang="en-GB" smtClean="0"/>
-              <a:t>02/10/2019</a:t>
+              <a:t>04/05/2020</a:t>
             </a:fld>
             <a:endParaRPr lang="en-GB"/>
           </a:p>
@@ -2234,7 +2416,7 @@
           <a:p>
             <a:fld id="{D884633D-11AC-4888-94B9-297E606567D1}" type="datetimeFigureOut">
               <a:rPr lang="en-GB" smtClean="0"/>
-              <a:t>02/10/2019</a:t>
+              <a:t>04/05/2020</a:t>
             </a:fld>
             <a:endParaRPr lang="en-GB"/>
           </a:p>
@@ -2510,7 +2692,7 @@
           <a:p>
             <a:fld id="{D884633D-11AC-4888-94B9-297E606567D1}" type="datetimeFigureOut">
               <a:rPr lang="en-GB" smtClean="0"/>
-              <a:t>02/10/2019</a:t>
+              <a:t>04/05/2020</a:t>
             </a:fld>
             <a:endParaRPr lang="en-GB"/>
           </a:p>
@@ -2778,7 +2960,7 @@
           <a:p>
             <a:fld id="{D884633D-11AC-4888-94B9-297E606567D1}" type="datetimeFigureOut">
               <a:rPr lang="en-GB" smtClean="0"/>
-              <a:t>02/10/2019</a:t>
+              <a:t>04/05/2020</a:t>
             </a:fld>
             <a:endParaRPr lang="en-GB"/>
           </a:p>
@@ -3193,7 +3375,7 @@
           <a:p>
             <a:fld id="{D884633D-11AC-4888-94B9-297E606567D1}" type="datetimeFigureOut">
               <a:rPr lang="en-GB" smtClean="0"/>
-              <a:t>02/10/2019</a:t>
+              <a:t>04/05/2020</a:t>
             </a:fld>
             <a:endParaRPr lang="en-GB"/>
           </a:p>
@@ -3335,7 +3517,7 @@
           <a:p>
             <a:fld id="{D884633D-11AC-4888-94B9-297E606567D1}" type="datetimeFigureOut">
               <a:rPr lang="en-GB" smtClean="0"/>
-              <a:t>02/10/2019</a:t>
+              <a:t>04/05/2020</a:t>
             </a:fld>
             <a:endParaRPr lang="en-GB"/>
           </a:p>
@@ -3448,7 +3630,7 @@
           <a:p>
             <a:fld id="{D884633D-11AC-4888-94B9-297E606567D1}" type="datetimeFigureOut">
               <a:rPr lang="en-GB" smtClean="0"/>
-              <a:t>02/10/2019</a:t>
+              <a:t>04/05/2020</a:t>
             </a:fld>
             <a:endParaRPr lang="en-GB"/>
           </a:p>
@@ -3761,7 +3943,7 @@
           <a:p>
             <a:fld id="{D884633D-11AC-4888-94B9-297E606567D1}" type="datetimeFigureOut">
               <a:rPr lang="en-GB" smtClean="0"/>
-              <a:t>02/10/2019</a:t>
+              <a:t>04/05/2020</a:t>
             </a:fld>
             <a:endParaRPr lang="en-GB"/>
           </a:p>
@@ -4050,7 +4232,7 @@
           <a:p>
             <a:fld id="{D884633D-11AC-4888-94B9-297E606567D1}" type="datetimeFigureOut">
               <a:rPr lang="en-GB" smtClean="0"/>
-              <a:t>02/10/2019</a:t>
+              <a:t>04/05/2020</a:t>
             </a:fld>
             <a:endParaRPr lang="en-GB"/>
           </a:p>
@@ -4302,7 +4484,7 @@
           <a:p>
             <a:fld id="{D884633D-11AC-4888-94B9-297E606567D1}" type="datetimeFigureOut">
               <a:rPr lang="en-GB" smtClean="0"/>
-              <a:t>02/10/2019</a:t>
+              <a:t>04/05/2020</a:t>
             </a:fld>
             <a:endParaRPr lang="en-GB"/>
           </a:p>
@@ -5581,54 +5763,55 @@
       </p:grpSpPr>
       <p:sp>
         <p:nvSpPr>
-          <p:cNvPr id="9" name="Title 1">
-            <a:extLst>
-              <a:ext uri="{FF2B5EF4-FFF2-40B4-BE49-F238E27FC236}">
-                <a16:creationId xmlns:a16="http://schemas.microsoft.com/office/drawing/2014/main" id="{907DD878-B76C-4FC5-9BC3-86C7C3DB3BDA}"/>
-              </a:ext>
-            </a:extLst>
-          </p:cNvPr>
-          <p:cNvSpPr>
-            <a:spLocks noGrp="1"/>
-          </p:cNvSpPr>
-          <p:nvPr>
-            <p:ph type="title"/>
-          </p:nvPr>
-        </p:nvSpPr>
-        <p:spPr>
+          <p:cNvPr id="3" name="AutoShape 2" descr="Q &amp; A">
+            <a:extLst>
+              <a:ext uri="{FF2B5EF4-FFF2-40B4-BE49-F238E27FC236}">
+                <a16:creationId xmlns:a16="http://schemas.microsoft.com/office/drawing/2014/main" id="{2D3FFEBE-5388-4A46-A0AF-9ADC5456286E}"/>
+              </a:ext>
+            </a:extLst>
+          </p:cNvPr>
+          <p:cNvSpPr>
+            <a:spLocks noChangeAspect="1" noChangeArrowheads="1"/>
+          </p:cNvSpPr>
+          <p:nvPr/>
+        </p:nvSpPr>
+        <p:spPr bwMode="auto">
           <a:xfrm>
-            <a:off x="942832" y="2766218"/>
-            <a:ext cx="11242960" cy="1325563"/>
+            <a:off x="5943600" y="3276600"/>
+            <a:ext cx="304800" cy="304800"/>
           </a:xfrm>
+          <a:prstGeom prst="rect">
+            <a:avLst/>
+          </a:prstGeom>
+          <a:noFill/>
+          <a:extLst>
+            <a:ext uri="{909E8E84-426E-40DD-AFC4-6F175D3DCCD1}">
+              <a14:hiddenFill xmlns:a14="http://schemas.microsoft.com/office/drawing/2010/main">
+                <a:solidFill>
+                  <a:srgbClr val="FFFFFF"/>
+                </a:solidFill>
+              </a14:hiddenFill>
+            </a:ext>
+          </a:extLst>
         </p:spPr>
         <p:txBody>
-          <a:bodyPr>
-            <a:normAutofit/>
+          <a:bodyPr vert="horz" wrap="square" lIns="91440" tIns="45720" rIns="91440" bIns="45720" numCol="1" anchor="t" anchorCtr="0" compatLnSpc="1">
+            <a:prstTxWarp prst="textNoShape">
+              <a:avLst/>
+            </a:prstTxWarp>
           </a:bodyPr>
           <a:lstStyle/>
           <a:p>
-            <a:pPr algn="ctr"/>
-            <a:r>
-              <a:rPr lang="en-GB" sz="6000" b="1" dirty="0">
-                <a:solidFill>
-                  <a:schemeClr val="tx1">
-                    <a:lumMod val="75000"/>
-                    <a:lumOff val="25000"/>
-                  </a:schemeClr>
-                </a:solidFill>
-                <a:latin typeface="Gabriola" panose="04040605051002020D02" pitchFamily="82" charset="0"/>
-              </a:rPr>
-              <a:t>Q&amp;A</a:t>
-            </a:r>
+            <a:endParaRPr lang="en-GB"/>
           </a:p>
         </p:txBody>
       </p:sp>
       <p:pic>
         <p:nvPicPr>
-          <p:cNvPr id="2" name="Picture 2" descr="http://www.landlordreferencing.co.uk/wp-content/uploads/2016/11/489f-hce-q-and-a-jpg.png">
-            <a:extLst>
-              <a:ext uri="{FF2B5EF4-FFF2-40B4-BE49-F238E27FC236}">
-                <a16:creationId xmlns:a16="http://schemas.microsoft.com/office/drawing/2014/main" id="{A3958ADD-11D2-4A36-B683-42F04B78B769}"/>
+          <p:cNvPr id="1030" name="Picture 6">
+            <a:extLst>
+              <a:ext uri="{FF2B5EF4-FFF2-40B4-BE49-F238E27FC236}">
+                <a16:creationId xmlns:a16="http://schemas.microsoft.com/office/drawing/2014/main" id="{DF3B20E7-DFB7-496B-A1B1-F29CEEFDF57F}"/>
               </a:ext>
             </a:extLst>
           </p:cNvPr>
@@ -5637,7 +5820,7 @@
           </p:cNvPicPr>
           <p:nvPr/>
         </p:nvPicPr>
-        <p:blipFill>
+        <p:blipFill rotWithShape="1">
           <a:blip r:embed="rId2">
             <a:extLst>
               <a:ext uri="{28A0092B-C50C-407E-A947-70E740481C1C}">
@@ -5645,15 +5828,13 @@
               </a:ext>
             </a:extLst>
           </a:blip>
-          <a:srcRect/>
-          <a:stretch>
-            <a:fillRect/>
-          </a:stretch>
+          <a:srcRect b="6853"/>
+          <a:stretch/>
         </p:blipFill>
         <p:spPr bwMode="auto">
           <a:xfrm>
-            <a:off x="3125787" y="1649413"/>
-            <a:ext cx="6877050" cy="3486150"/>
+            <a:off x="3794845" y="1519571"/>
+            <a:ext cx="5538936" cy="3745834"/>
           </a:xfrm>
           <a:prstGeom prst="rect">
             <a:avLst/>

</xml_diff>

<commit_message>
pptx template and litReview template
</commit_message>
<xml_diff>
--- a/0.Miscellaneous/PPT_resources/pptTemplate.pptx
+++ b/0.Miscellaneous/PPT_resources/pptTemplate.pptx
@@ -1,6 +1,6 @@
 
 <file path=ppt/presentation.xml><?xml version="1.0" encoding="utf-8"?>
-<p:presentation xmlns:a="http://schemas.openxmlformats.org/drawingml/2006/main" xmlns:r="http://schemas.openxmlformats.org/officeDocument/2006/relationships" xmlns:p="http://schemas.openxmlformats.org/presentationml/2006/main" saveSubsetFonts="1">
+<p:presentation xmlns:a="http://schemas.openxmlformats.org/drawingml/2006/main" xmlns:r="http://schemas.openxmlformats.org/officeDocument/2006/relationships" xmlns:p="http://schemas.openxmlformats.org/presentationml/2006/main" showSpecialPlsOnTitleSld="0" saveSubsetFonts="1">
   <p:sldMasterIdLst>
     <p:sldMasterId id="2147483648" r:id="rId1"/>
   </p:sldMasterIdLst>
@@ -178,7 +178,7 @@
 <file path=ppt/revisionInfo.xml><?xml version="1.0" encoding="utf-8"?>
 <p1510:revInfo xmlns:a="http://schemas.openxmlformats.org/drawingml/2006/main" xmlns:r="http://schemas.openxmlformats.org/officeDocument/2006/relationships" xmlns:p1510="http://schemas.microsoft.com/office/powerpoint/2015/10/main">
   <p1510:revLst>
-    <p1510:client id="{D962D6D7-454A-41C7-98A7-DA876A9E1509}" v="25" dt="2020-05-04T16:19:55.653"/>
+    <p1510:client id="{D962D6D7-454A-41C7-98A7-DA876A9E1509}" v="33" dt="2020-05-06T18:01:03.268"/>
   </p1510:revLst>
 </p1510:revInfo>
 </file>
@@ -972,7 +972,7 @@
   <pc:docChgLst>
     <pc:chgData name="Antonio Osamu Katagiri Tanaka" userId="2c28225e-d492-4964-8551-1b0a3c65dda0" providerId="ADAL" clId="{D962D6D7-454A-41C7-98A7-DA876A9E1509}"/>
     <pc:docChg chg="undo custSel modSld modMainMaster">
-      <pc:chgData name="Antonio Osamu Katagiri Tanaka" userId="2c28225e-d492-4964-8551-1b0a3c65dda0" providerId="ADAL" clId="{D962D6D7-454A-41C7-98A7-DA876A9E1509}" dt="2020-05-04T16:19:55.243" v="80" actId="20577"/>
+      <pc:chgData name="Antonio Osamu Katagiri Tanaka" userId="2c28225e-d492-4964-8551-1b0a3c65dda0" providerId="ADAL" clId="{D962D6D7-454A-41C7-98A7-DA876A9E1509}" dt="2020-05-06T18:02:23.988" v="291" actId="1076"/>
       <pc:docMkLst>
         <pc:docMk/>
       </pc:docMkLst>
@@ -1054,51 +1054,244 @@
           </ac:picMkLst>
         </pc:picChg>
       </pc:sldChg>
-      <pc:sldMasterChg chg="setBg modSldLayout">
-        <pc:chgData name="Antonio Osamu Katagiri Tanaka" userId="2c28225e-d492-4964-8551-1b0a3c65dda0" providerId="ADAL" clId="{D962D6D7-454A-41C7-98A7-DA876A9E1509}" dt="2020-05-04T16:10:55.133" v="8"/>
+      <pc:sldMasterChg chg="modSp mod setBg modSldLayout">
+        <pc:chgData name="Antonio Osamu Katagiri Tanaka" userId="2c28225e-d492-4964-8551-1b0a3c65dda0" providerId="ADAL" clId="{D962D6D7-454A-41C7-98A7-DA876A9E1509}" dt="2020-05-06T18:02:23.988" v="291" actId="1076"/>
         <pc:sldMasterMkLst>
           <pc:docMk/>
           <pc:sldMasterMk cId="2403102699" sldId="2147483648"/>
         </pc:sldMasterMkLst>
-        <pc:sldLayoutChg chg="setBg">
-          <pc:chgData name="Antonio Osamu Katagiri Tanaka" userId="2c28225e-d492-4964-8551-1b0a3c65dda0" providerId="ADAL" clId="{D962D6D7-454A-41C7-98A7-DA876A9E1509}" dt="2020-05-04T16:10:55.133" v="8"/>
+        <pc:spChg chg="mod">
+          <ac:chgData name="Antonio Osamu Katagiri Tanaka" userId="2c28225e-d492-4964-8551-1b0a3c65dda0" providerId="ADAL" clId="{D962D6D7-454A-41C7-98A7-DA876A9E1509}" dt="2020-05-06T17:58:29.178" v="119" actId="2711"/>
+          <ac:spMkLst>
+            <pc:docMk/>
+            <pc:sldMasterMk cId="2403102699" sldId="2147483648"/>
+            <ac:spMk id="2" creationId="{4058ABB2-B490-47FF-90EB-CD4D3E37C9F0}"/>
+          </ac:spMkLst>
+        </pc:spChg>
+        <pc:spChg chg="mod">
+          <ac:chgData name="Antonio Osamu Katagiri Tanaka" userId="2c28225e-d492-4964-8551-1b0a3c65dda0" providerId="ADAL" clId="{D962D6D7-454A-41C7-98A7-DA876A9E1509}" dt="2020-05-06T17:58:29.178" v="119" actId="2711"/>
+          <ac:spMkLst>
+            <pc:docMk/>
+            <pc:sldMasterMk cId="2403102699" sldId="2147483648"/>
+            <ac:spMk id="3" creationId="{45D6D09A-7161-461C-9416-A965993AB85A}"/>
+          </ac:spMkLst>
+        </pc:spChg>
+        <pc:spChg chg="mod">
+          <ac:chgData name="Antonio Osamu Katagiri Tanaka" userId="2c28225e-d492-4964-8551-1b0a3c65dda0" providerId="ADAL" clId="{D962D6D7-454A-41C7-98A7-DA876A9E1509}" dt="2020-05-06T18:02:10.392" v="288" actId="1076"/>
+          <ac:spMkLst>
+            <pc:docMk/>
+            <pc:sldMasterMk cId="2403102699" sldId="2147483648"/>
+            <ac:spMk id="4" creationId="{61D5A034-8476-4107-8627-EB6E11CCB2AD}"/>
+          </ac:spMkLst>
+        </pc:spChg>
+        <pc:spChg chg="mod">
+          <ac:chgData name="Antonio Osamu Katagiri Tanaka" userId="2c28225e-d492-4964-8551-1b0a3c65dda0" providerId="ADAL" clId="{D962D6D7-454A-41C7-98A7-DA876A9E1509}" dt="2020-05-06T18:02:10.392" v="288" actId="1076"/>
+          <ac:spMkLst>
+            <pc:docMk/>
+            <pc:sldMasterMk cId="2403102699" sldId="2147483648"/>
+            <ac:spMk id="5" creationId="{3EEB07D8-FD16-4F5A-A35D-B7A908B2AD1A}"/>
+          </ac:spMkLst>
+        </pc:spChg>
+        <pc:spChg chg="mod">
+          <ac:chgData name="Antonio Osamu Katagiri Tanaka" userId="2c28225e-d492-4964-8551-1b0a3c65dda0" providerId="ADAL" clId="{D962D6D7-454A-41C7-98A7-DA876A9E1509}" dt="2020-05-06T18:02:23.988" v="291" actId="1076"/>
+          <ac:spMkLst>
+            <pc:docMk/>
+            <pc:sldMasterMk cId="2403102699" sldId="2147483648"/>
+            <ac:spMk id="6" creationId="{A22F53A1-7893-45BA-AFD9-7BE608102FD3}"/>
+          </ac:spMkLst>
+        </pc:spChg>
+        <pc:sldLayoutChg chg="modSp mod setBg">
+          <pc:chgData name="Antonio Osamu Katagiri Tanaka" userId="2c28225e-d492-4964-8551-1b0a3c65dda0" providerId="ADAL" clId="{D962D6D7-454A-41C7-98A7-DA876A9E1509}" dt="2020-05-06T17:56:25.179" v="105" actId="1076"/>
           <pc:sldLayoutMkLst>
             <pc:docMk/>
             <pc:sldMasterMk cId="2403102699" sldId="2147483648"/>
             <pc:sldLayoutMk cId="4257312655" sldId="2147483649"/>
           </pc:sldLayoutMkLst>
+          <pc:spChg chg="mod">
+            <ac:chgData name="Antonio Osamu Katagiri Tanaka" userId="2c28225e-d492-4964-8551-1b0a3c65dda0" providerId="ADAL" clId="{D962D6D7-454A-41C7-98A7-DA876A9E1509}" dt="2020-05-06T17:56:25.179" v="105" actId="1076"/>
+            <ac:spMkLst>
+              <pc:docMk/>
+              <pc:sldMasterMk cId="2403102699" sldId="2147483648"/>
+              <pc:sldLayoutMk cId="4257312655" sldId="2147483649"/>
+              <ac:spMk id="2" creationId="{A15DA177-A0FC-4DBC-B7B5-4ABA2CE5F756}"/>
+            </ac:spMkLst>
+          </pc:spChg>
+          <pc:spChg chg="mod">
+            <ac:chgData name="Antonio Osamu Katagiri Tanaka" userId="2c28225e-d492-4964-8551-1b0a3c65dda0" providerId="ADAL" clId="{D962D6D7-454A-41C7-98A7-DA876A9E1509}" dt="2020-05-06T17:56:25.179" v="105" actId="1076"/>
+            <ac:spMkLst>
+              <pc:docMk/>
+              <pc:sldMasterMk cId="2403102699" sldId="2147483648"/>
+              <pc:sldLayoutMk cId="4257312655" sldId="2147483649"/>
+              <ac:spMk id="3" creationId="{BAD0EED8-4909-420C-9359-C8245CF3B33E}"/>
+            </ac:spMkLst>
+          </pc:spChg>
+          <pc:spChg chg="mod">
+            <ac:chgData name="Antonio Osamu Katagiri Tanaka" userId="2c28225e-d492-4964-8551-1b0a3c65dda0" providerId="ADAL" clId="{D962D6D7-454A-41C7-98A7-DA876A9E1509}" dt="2020-05-06T17:55:49.233" v="94" actId="1037"/>
+            <ac:spMkLst>
+              <pc:docMk/>
+              <pc:sldMasterMk cId="2403102699" sldId="2147483648"/>
+              <pc:sldLayoutMk cId="4257312655" sldId="2147483649"/>
+              <ac:spMk id="4" creationId="{F67EA5FD-9813-4D78-A444-844D6C9C7966}"/>
+            </ac:spMkLst>
+          </pc:spChg>
+          <pc:spChg chg="mod">
+            <ac:chgData name="Antonio Osamu Katagiri Tanaka" userId="2c28225e-d492-4964-8551-1b0a3c65dda0" providerId="ADAL" clId="{D962D6D7-454A-41C7-98A7-DA876A9E1509}" dt="2020-05-06T17:56:16.086" v="103" actId="1076"/>
+            <ac:spMkLst>
+              <pc:docMk/>
+              <pc:sldMasterMk cId="2403102699" sldId="2147483648"/>
+              <pc:sldLayoutMk cId="4257312655" sldId="2147483649"/>
+              <ac:spMk id="5" creationId="{330619A2-14E8-4349-9294-5F79462A6F3A}"/>
+            </ac:spMkLst>
+          </pc:spChg>
+          <pc:spChg chg="mod">
+            <ac:chgData name="Antonio Osamu Katagiri Tanaka" userId="2c28225e-d492-4964-8551-1b0a3c65dda0" providerId="ADAL" clId="{D962D6D7-454A-41C7-98A7-DA876A9E1509}" dt="2020-05-06T17:55:38.638" v="81" actId="1076"/>
+            <ac:spMkLst>
+              <pc:docMk/>
+              <pc:sldMasterMk cId="2403102699" sldId="2147483648"/>
+              <pc:sldLayoutMk cId="4257312655" sldId="2147483649"/>
+              <ac:spMk id="6" creationId="{1B413D95-19C4-4017-83C0-65CB5412D4D4}"/>
+            </ac:spMkLst>
+          </pc:spChg>
         </pc:sldLayoutChg>
-        <pc:sldLayoutChg chg="setBg">
-          <pc:chgData name="Antonio Osamu Katagiri Tanaka" userId="2c28225e-d492-4964-8551-1b0a3c65dda0" providerId="ADAL" clId="{D962D6D7-454A-41C7-98A7-DA876A9E1509}" dt="2020-05-04T16:10:55.133" v="8"/>
+        <pc:sldLayoutChg chg="modSp mod setBg">
+          <pc:chgData name="Antonio Osamu Katagiri Tanaka" userId="2c28225e-d492-4964-8551-1b0a3c65dda0" providerId="ADAL" clId="{D962D6D7-454A-41C7-98A7-DA876A9E1509}" dt="2020-05-06T18:01:50.451" v="287" actId="1076"/>
           <pc:sldLayoutMkLst>
             <pc:docMk/>
             <pc:sldMasterMk cId="2403102699" sldId="2147483648"/>
             <pc:sldLayoutMk cId="473447723" sldId="2147483650"/>
           </pc:sldLayoutMkLst>
+          <pc:spChg chg="mod">
+            <ac:chgData name="Antonio Osamu Katagiri Tanaka" userId="2c28225e-d492-4964-8551-1b0a3c65dda0" providerId="ADAL" clId="{D962D6D7-454A-41C7-98A7-DA876A9E1509}" dt="2020-05-06T18:01:50.451" v="287" actId="1076"/>
+            <ac:spMkLst>
+              <pc:docMk/>
+              <pc:sldMasterMk cId="2403102699" sldId="2147483648"/>
+              <pc:sldLayoutMk cId="473447723" sldId="2147483650"/>
+              <ac:spMk id="4" creationId="{A2E4ED0E-6116-4991-9AF2-0108DBCEE2AB}"/>
+            </ac:spMkLst>
+          </pc:spChg>
+          <pc:spChg chg="mod">
+            <ac:chgData name="Antonio Osamu Katagiri Tanaka" userId="2c28225e-d492-4964-8551-1b0a3c65dda0" providerId="ADAL" clId="{D962D6D7-454A-41C7-98A7-DA876A9E1509}" dt="2020-05-06T18:01:47.033" v="286" actId="1076"/>
+            <ac:spMkLst>
+              <pc:docMk/>
+              <pc:sldMasterMk cId="2403102699" sldId="2147483648"/>
+              <pc:sldLayoutMk cId="473447723" sldId="2147483650"/>
+              <ac:spMk id="5" creationId="{C558BA4F-EE41-4F30-89A4-1E9659BBA0F6}"/>
+            </ac:spMkLst>
+          </pc:spChg>
+          <pc:spChg chg="mod">
+            <ac:chgData name="Antonio Osamu Katagiri Tanaka" userId="2c28225e-d492-4964-8551-1b0a3c65dda0" providerId="ADAL" clId="{D962D6D7-454A-41C7-98A7-DA876A9E1509}" dt="2020-05-06T18:01:43.234" v="285" actId="1076"/>
+            <ac:spMkLst>
+              <pc:docMk/>
+              <pc:sldMasterMk cId="2403102699" sldId="2147483648"/>
+              <pc:sldLayoutMk cId="473447723" sldId="2147483650"/>
+              <ac:spMk id="6" creationId="{5C1AF694-4D4B-482E-A784-BFB2EEE62C1A}"/>
+            </ac:spMkLst>
+          </pc:spChg>
         </pc:sldLayoutChg>
-        <pc:sldLayoutChg chg="setBg">
-          <pc:chgData name="Antonio Osamu Katagiri Tanaka" userId="2c28225e-d492-4964-8551-1b0a3c65dda0" providerId="ADAL" clId="{D962D6D7-454A-41C7-98A7-DA876A9E1509}" dt="2020-05-04T16:10:55.133" v="8"/>
+        <pc:sldLayoutChg chg="modSp mod setBg">
+          <pc:chgData name="Antonio Osamu Katagiri Tanaka" userId="2c28225e-d492-4964-8551-1b0a3c65dda0" providerId="ADAL" clId="{D962D6D7-454A-41C7-98A7-DA876A9E1509}" dt="2020-05-06T17:58:58.589" v="150" actId="1037"/>
           <pc:sldLayoutMkLst>
             <pc:docMk/>
             <pc:sldMasterMk cId="2403102699" sldId="2147483648"/>
             <pc:sldLayoutMk cId="1765815900" sldId="2147483651"/>
           </pc:sldLayoutMkLst>
+          <pc:spChg chg="mod">
+            <ac:chgData name="Antonio Osamu Katagiri Tanaka" userId="2c28225e-d492-4964-8551-1b0a3c65dda0" providerId="ADAL" clId="{D962D6D7-454A-41C7-98A7-DA876A9E1509}" dt="2020-05-06T17:58:58.589" v="150" actId="1037"/>
+            <ac:spMkLst>
+              <pc:docMk/>
+              <pc:sldMasterMk cId="2403102699" sldId="2147483648"/>
+              <pc:sldLayoutMk cId="1765815900" sldId="2147483651"/>
+              <ac:spMk id="2" creationId="{EADD464F-617B-4174-B3D1-08693734D58A}"/>
+            </ac:spMkLst>
+          </pc:spChg>
+          <pc:spChg chg="mod">
+            <ac:chgData name="Antonio Osamu Katagiri Tanaka" userId="2c28225e-d492-4964-8551-1b0a3c65dda0" providerId="ADAL" clId="{D962D6D7-454A-41C7-98A7-DA876A9E1509}" dt="2020-05-06T17:58:58.589" v="150" actId="1037"/>
+            <ac:spMkLst>
+              <pc:docMk/>
+              <pc:sldMasterMk cId="2403102699" sldId="2147483648"/>
+              <pc:sldLayoutMk cId="1765815900" sldId="2147483651"/>
+              <ac:spMk id="3" creationId="{1EB79DC7-E4D1-40FE-9056-280392BDEFD7}"/>
+            </ac:spMkLst>
+          </pc:spChg>
         </pc:sldLayoutChg>
-        <pc:sldLayoutChg chg="setBg">
-          <pc:chgData name="Antonio Osamu Katagiri Tanaka" userId="2c28225e-d492-4964-8551-1b0a3c65dda0" providerId="ADAL" clId="{D962D6D7-454A-41C7-98A7-DA876A9E1509}" dt="2020-05-04T16:10:55.133" v="8"/>
+        <pc:sldLayoutChg chg="modSp mod setBg">
+          <pc:chgData name="Antonio Osamu Katagiri Tanaka" userId="2c28225e-d492-4964-8551-1b0a3c65dda0" providerId="ADAL" clId="{D962D6D7-454A-41C7-98A7-DA876A9E1509}" dt="2020-05-06T17:59:11.149" v="176" actId="1038"/>
           <pc:sldLayoutMkLst>
             <pc:docMk/>
             <pc:sldMasterMk cId="2403102699" sldId="2147483648"/>
             <pc:sldLayoutMk cId="1787570629" sldId="2147483652"/>
           </pc:sldLayoutMkLst>
+          <pc:spChg chg="mod">
+            <ac:chgData name="Antonio Osamu Katagiri Tanaka" userId="2c28225e-d492-4964-8551-1b0a3c65dda0" providerId="ADAL" clId="{D962D6D7-454A-41C7-98A7-DA876A9E1509}" dt="2020-05-06T17:59:11.149" v="176" actId="1038"/>
+            <ac:spMkLst>
+              <pc:docMk/>
+              <pc:sldMasterMk cId="2403102699" sldId="2147483648"/>
+              <pc:sldLayoutMk cId="1787570629" sldId="2147483652"/>
+              <ac:spMk id="3" creationId="{1A20A5F4-A1A2-452D-AB94-532C54E04165}"/>
+            </ac:spMkLst>
+          </pc:spChg>
+          <pc:spChg chg="mod">
+            <ac:chgData name="Antonio Osamu Katagiri Tanaka" userId="2c28225e-d492-4964-8551-1b0a3c65dda0" providerId="ADAL" clId="{D962D6D7-454A-41C7-98A7-DA876A9E1509}" dt="2020-05-06T17:59:11.149" v="176" actId="1038"/>
+            <ac:spMkLst>
+              <pc:docMk/>
+              <pc:sldMasterMk cId="2403102699" sldId="2147483648"/>
+              <pc:sldLayoutMk cId="1787570629" sldId="2147483652"/>
+              <ac:spMk id="4" creationId="{92FD7A53-2967-4B36-835E-ECA203A78B77}"/>
+            </ac:spMkLst>
+          </pc:spChg>
         </pc:sldLayoutChg>
-        <pc:sldLayoutChg chg="setBg">
-          <pc:chgData name="Antonio Osamu Katagiri Tanaka" userId="2c28225e-d492-4964-8551-1b0a3c65dda0" providerId="ADAL" clId="{D962D6D7-454A-41C7-98A7-DA876A9E1509}" dt="2020-05-04T16:10:55.133" v="8"/>
+        <pc:sldLayoutChg chg="modSp mod setBg">
+          <pc:chgData name="Antonio Osamu Katagiri Tanaka" userId="2c28225e-d492-4964-8551-1b0a3c65dda0" providerId="ADAL" clId="{D962D6D7-454A-41C7-98A7-DA876A9E1509}" dt="2020-05-06T17:59:34.073" v="205" actId="14100"/>
           <pc:sldLayoutMkLst>
             <pc:docMk/>
             <pc:sldMasterMk cId="2403102699" sldId="2147483648"/>
             <pc:sldLayoutMk cId="1223017044" sldId="2147483653"/>
           </pc:sldLayoutMkLst>
+          <pc:spChg chg="mod">
+            <ac:chgData name="Antonio Osamu Katagiri Tanaka" userId="2c28225e-d492-4964-8551-1b0a3c65dda0" providerId="ADAL" clId="{D962D6D7-454A-41C7-98A7-DA876A9E1509}" dt="2020-05-06T17:59:34.073" v="205" actId="14100"/>
+            <ac:spMkLst>
+              <pc:docMk/>
+              <pc:sldMasterMk cId="2403102699" sldId="2147483648"/>
+              <pc:sldLayoutMk cId="1223017044" sldId="2147483653"/>
+              <ac:spMk id="2" creationId="{D2590BE5-232C-47FC-830F-082276010466}"/>
+            </ac:spMkLst>
+          </pc:spChg>
+          <pc:spChg chg="mod">
+            <ac:chgData name="Antonio Osamu Katagiri Tanaka" userId="2c28225e-d492-4964-8551-1b0a3c65dda0" providerId="ADAL" clId="{D962D6D7-454A-41C7-98A7-DA876A9E1509}" dt="2020-05-06T17:59:26.817" v="202" actId="1037"/>
+            <ac:spMkLst>
+              <pc:docMk/>
+              <pc:sldMasterMk cId="2403102699" sldId="2147483648"/>
+              <pc:sldLayoutMk cId="1223017044" sldId="2147483653"/>
+              <ac:spMk id="3" creationId="{00FCBD9D-7609-4F6E-BE48-506E638B54C6}"/>
+            </ac:spMkLst>
+          </pc:spChg>
+          <pc:spChg chg="mod">
+            <ac:chgData name="Antonio Osamu Katagiri Tanaka" userId="2c28225e-d492-4964-8551-1b0a3c65dda0" providerId="ADAL" clId="{D962D6D7-454A-41C7-98A7-DA876A9E1509}" dt="2020-05-06T17:59:26.817" v="202" actId="1037"/>
+            <ac:spMkLst>
+              <pc:docMk/>
+              <pc:sldMasterMk cId="2403102699" sldId="2147483648"/>
+              <pc:sldLayoutMk cId="1223017044" sldId="2147483653"/>
+              <ac:spMk id="4" creationId="{12E2A0EC-7212-48F6-B9CE-ACD96E2F0610}"/>
+            </ac:spMkLst>
+          </pc:spChg>
+          <pc:spChg chg="mod">
+            <ac:chgData name="Antonio Osamu Katagiri Tanaka" userId="2c28225e-d492-4964-8551-1b0a3c65dda0" providerId="ADAL" clId="{D962D6D7-454A-41C7-98A7-DA876A9E1509}" dt="2020-05-06T17:59:26.817" v="202" actId="1037"/>
+            <ac:spMkLst>
+              <pc:docMk/>
+              <pc:sldMasterMk cId="2403102699" sldId="2147483648"/>
+              <pc:sldLayoutMk cId="1223017044" sldId="2147483653"/>
+              <ac:spMk id="5" creationId="{CDA50457-4D2A-4248-A1E0-E5BAB7B0BD56}"/>
+            </ac:spMkLst>
+          </pc:spChg>
+          <pc:spChg chg="mod">
+            <ac:chgData name="Antonio Osamu Katagiri Tanaka" userId="2c28225e-d492-4964-8551-1b0a3c65dda0" providerId="ADAL" clId="{D962D6D7-454A-41C7-98A7-DA876A9E1509}" dt="2020-05-06T17:59:26.817" v="202" actId="1037"/>
+            <ac:spMkLst>
+              <pc:docMk/>
+              <pc:sldMasterMk cId="2403102699" sldId="2147483648"/>
+              <pc:sldLayoutMk cId="1223017044" sldId="2147483653"/>
+              <ac:spMk id="6" creationId="{24780775-5344-4961-BED0-8A1AE66D7172}"/>
+            </ac:spMkLst>
+          </pc:spChg>
         </pc:sldLayoutChg>
         <pc:sldLayoutChg chg="setBg">
           <pc:chgData name="Antonio Osamu Katagiri Tanaka" userId="2c28225e-d492-4964-8551-1b0a3c65dda0" providerId="ADAL" clId="{D962D6D7-454A-41C7-98A7-DA876A9E1509}" dt="2020-05-04T16:10:55.133" v="8"/>
@@ -1116,37 +1309,109 @@
             <pc:sldLayoutMk cId="2251026656" sldId="2147483655"/>
           </pc:sldLayoutMkLst>
         </pc:sldLayoutChg>
-        <pc:sldLayoutChg chg="setBg">
-          <pc:chgData name="Antonio Osamu Katagiri Tanaka" userId="2c28225e-d492-4964-8551-1b0a3c65dda0" providerId="ADAL" clId="{D962D6D7-454A-41C7-98A7-DA876A9E1509}" dt="2020-05-04T16:10:55.133" v="8"/>
+        <pc:sldLayoutChg chg="modSp mod setBg">
+          <pc:chgData name="Antonio Osamu Katagiri Tanaka" userId="2c28225e-d492-4964-8551-1b0a3c65dda0" providerId="ADAL" clId="{D962D6D7-454A-41C7-98A7-DA876A9E1509}" dt="2020-05-06T17:59:44.365" v="232" actId="1037"/>
           <pc:sldLayoutMkLst>
             <pc:docMk/>
             <pc:sldMasterMk cId="2403102699" sldId="2147483648"/>
             <pc:sldLayoutMk cId="49165472" sldId="2147483656"/>
           </pc:sldLayoutMkLst>
+          <pc:spChg chg="mod">
+            <ac:chgData name="Antonio Osamu Katagiri Tanaka" userId="2c28225e-d492-4964-8551-1b0a3c65dda0" providerId="ADAL" clId="{D962D6D7-454A-41C7-98A7-DA876A9E1509}" dt="2020-05-06T17:59:44.365" v="232" actId="1037"/>
+            <ac:spMkLst>
+              <pc:docMk/>
+              <pc:sldMasterMk cId="2403102699" sldId="2147483648"/>
+              <pc:sldLayoutMk cId="49165472" sldId="2147483656"/>
+              <ac:spMk id="2" creationId="{01EA08D6-FC53-4087-B636-D0CB3352A763}"/>
+            </ac:spMkLst>
+          </pc:spChg>
+          <pc:spChg chg="mod">
+            <ac:chgData name="Antonio Osamu Katagiri Tanaka" userId="2c28225e-d492-4964-8551-1b0a3c65dda0" providerId="ADAL" clId="{D962D6D7-454A-41C7-98A7-DA876A9E1509}" dt="2020-05-06T17:59:44.365" v="232" actId="1037"/>
+            <ac:spMkLst>
+              <pc:docMk/>
+              <pc:sldMasterMk cId="2403102699" sldId="2147483648"/>
+              <pc:sldLayoutMk cId="49165472" sldId="2147483656"/>
+              <ac:spMk id="3" creationId="{2C4BBAB5-877E-4762-BF43-3C55140F4553}"/>
+            </ac:spMkLst>
+          </pc:spChg>
+          <pc:spChg chg="mod">
+            <ac:chgData name="Antonio Osamu Katagiri Tanaka" userId="2c28225e-d492-4964-8551-1b0a3c65dda0" providerId="ADAL" clId="{D962D6D7-454A-41C7-98A7-DA876A9E1509}" dt="2020-05-06T17:59:44.365" v="232" actId="1037"/>
+            <ac:spMkLst>
+              <pc:docMk/>
+              <pc:sldMasterMk cId="2403102699" sldId="2147483648"/>
+              <pc:sldLayoutMk cId="49165472" sldId="2147483656"/>
+              <ac:spMk id="4" creationId="{358D4FF6-774C-40D4-B0A7-95169C13A792}"/>
+            </ac:spMkLst>
+          </pc:spChg>
+        </pc:sldLayoutChg>
+        <pc:sldLayoutChg chg="modSp mod setBg">
+          <pc:chgData name="Antonio Osamu Katagiri Tanaka" userId="2c28225e-d492-4964-8551-1b0a3c65dda0" providerId="ADAL" clId="{D962D6D7-454A-41C7-98A7-DA876A9E1509}" dt="2020-05-06T17:59:56.763" v="261" actId="1038"/>
+          <pc:sldLayoutMkLst>
+            <pc:docMk/>
+            <pc:sldMasterMk cId="2403102699" sldId="2147483648"/>
+            <pc:sldLayoutMk cId="521446591" sldId="2147483657"/>
+          </pc:sldLayoutMkLst>
+          <pc:spChg chg="mod">
+            <ac:chgData name="Antonio Osamu Katagiri Tanaka" userId="2c28225e-d492-4964-8551-1b0a3c65dda0" providerId="ADAL" clId="{D962D6D7-454A-41C7-98A7-DA876A9E1509}" dt="2020-05-06T17:59:56.763" v="261" actId="1038"/>
+            <ac:spMkLst>
+              <pc:docMk/>
+              <pc:sldMasterMk cId="2403102699" sldId="2147483648"/>
+              <pc:sldLayoutMk cId="521446591" sldId="2147483657"/>
+              <ac:spMk id="2" creationId="{78C5CDEE-372D-43DC-87FC-108E5275CDDB}"/>
+            </ac:spMkLst>
+          </pc:spChg>
+          <pc:spChg chg="mod">
+            <ac:chgData name="Antonio Osamu Katagiri Tanaka" userId="2c28225e-d492-4964-8551-1b0a3c65dda0" providerId="ADAL" clId="{D962D6D7-454A-41C7-98A7-DA876A9E1509}" dt="2020-05-06T17:59:56.763" v="261" actId="1038"/>
+            <ac:spMkLst>
+              <pc:docMk/>
+              <pc:sldMasterMk cId="2403102699" sldId="2147483648"/>
+              <pc:sldLayoutMk cId="521446591" sldId="2147483657"/>
+              <ac:spMk id="3" creationId="{93521A81-433F-4839-AFB3-A6103F3DD430}"/>
+            </ac:spMkLst>
+          </pc:spChg>
+          <pc:spChg chg="mod">
+            <ac:chgData name="Antonio Osamu Katagiri Tanaka" userId="2c28225e-d492-4964-8551-1b0a3c65dda0" providerId="ADAL" clId="{D962D6D7-454A-41C7-98A7-DA876A9E1509}" dt="2020-05-06T17:59:56.763" v="261" actId="1038"/>
+            <ac:spMkLst>
+              <pc:docMk/>
+              <pc:sldMasterMk cId="2403102699" sldId="2147483648"/>
+              <pc:sldLayoutMk cId="521446591" sldId="2147483657"/>
+              <ac:spMk id="4" creationId="{F396A426-DDEA-4D9F-AF86-F90F668B3BA3}"/>
+            </ac:spMkLst>
+          </pc:spChg>
         </pc:sldLayoutChg>
         <pc:sldLayoutChg chg="setBg">
           <pc:chgData name="Antonio Osamu Katagiri Tanaka" userId="2c28225e-d492-4964-8551-1b0a3c65dda0" providerId="ADAL" clId="{D962D6D7-454A-41C7-98A7-DA876A9E1509}" dt="2020-05-04T16:10:55.133" v="8"/>
           <pc:sldLayoutMkLst>
             <pc:docMk/>
             <pc:sldMasterMk cId="2403102699" sldId="2147483648"/>
-            <pc:sldLayoutMk cId="521446591" sldId="2147483657"/>
-          </pc:sldLayoutMkLst>
-        </pc:sldLayoutChg>
-        <pc:sldLayoutChg chg="setBg">
-          <pc:chgData name="Antonio Osamu Katagiri Tanaka" userId="2c28225e-d492-4964-8551-1b0a3c65dda0" providerId="ADAL" clId="{D962D6D7-454A-41C7-98A7-DA876A9E1509}" dt="2020-05-04T16:10:55.133" v="8"/>
-          <pc:sldLayoutMkLst>
-            <pc:docMk/>
-            <pc:sldMasterMk cId="2403102699" sldId="2147483648"/>
             <pc:sldLayoutMk cId="653133263" sldId="2147483658"/>
           </pc:sldLayoutMkLst>
         </pc:sldLayoutChg>
-        <pc:sldLayoutChg chg="setBg">
-          <pc:chgData name="Antonio Osamu Katagiri Tanaka" userId="2c28225e-d492-4964-8551-1b0a3c65dda0" providerId="ADAL" clId="{D962D6D7-454A-41C7-98A7-DA876A9E1509}" dt="2020-05-04T16:10:55.133" v="8"/>
+        <pc:sldLayoutChg chg="modSp mod setBg">
+          <pc:chgData name="Antonio Osamu Katagiri Tanaka" userId="2c28225e-d492-4964-8551-1b0a3c65dda0" providerId="ADAL" clId="{D962D6D7-454A-41C7-98A7-DA876A9E1509}" dt="2020-05-06T18:00:09.089" v="281" actId="1037"/>
           <pc:sldLayoutMkLst>
             <pc:docMk/>
             <pc:sldMasterMk cId="2403102699" sldId="2147483648"/>
             <pc:sldLayoutMk cId="3334238241" sldId="2147483659"/>
           </pc:sldLayoutMkLst>
+          <pc:spChg chg="mod">
+            <ac:chgData name="Antonio Osamu Katagiri Tanaka" userId="2c28225e-d492-4964-8551-1b0a3c65dda0" providerId="ADAL" clId="{D962D6D7-454A-41C7-98A7-DA876A9E1509}" dt="2020-05-06T18:00:09.089" v="281" actId="1037"/>
+            <ac:spMkLst>
+              <pc:docMk/>
+              <pc:sldMasterMk cId="2403102699" sldId="2147483648"/>
+              <pc:sldLayoutMk cId="3334238241" sldId="2147483659"/>
+              <ac:spMk id="2" creationId="{59A06716-0DD5-4144-AB2F-21D187C810CF}"/>
+            </ac:spMkLst>
+          </pc:spChg>
+          <pc:spChg chg="mod">
+            <ac:chgData name="Antonio Osamu Katagiri Tanaka" userId="2c28225e-d492-4964-8551-1b0a3c65dda0" providerId="ADAL" clId="{D962D6D7-454A-41C7-98A7-DA876A9E1509}" dt="2020-05-06T18:00:09.089" v="281" actId="1037"/>
+            <ac:spMkLst>
+              <pc:docMk/>
+              <pc:sldMasterMk cId="2403102699" sldId="2147483648"/>
+              <pc:sldLayoutMk cId="3334238241" sldId="2147483659"/>
+              <ac:spMk id="3" creationId="{041EE26B-79F2-4544-84CC-39A992C2302B}"/>
+            </ac:spMkLst>
+          </pc:spChg>
         </pc:sldLayoutChg>
       </pc:sldMasterChg>
     </pc:docChg>
@@ -1298,7 +1563,7 @@
           <a:p>
             <a:fld id="{1B402B64-CAC4-4D07-834F-F232921309C8}" type="datetimeFigureOut">
               <a:rPr lang="en-GB" smtClean="0"/>
-              <a:t>04/05/2020</a:t>
+              <a:t>06/05/2020</a:t>
             </a:fld>
             <a:endParaRPr lang="en-GB"/>
           </a:p>
@@ -1692,7 +1957,7 @@
         </p:nvSpPr>
         <p:spPr>
           <a:xfrm>
-            <a:off x="1524000" y="1122363"/>
+            <a:off x="2007424" y="1258888"/>
             <a:ext cx="9144000" cy="2387600"/>
           </a:xfrm>
         </p:spPr>
@@ -1730,7 +1995,7 @@
         </p:nvSpPr>
         <p:spPr>
           <a:xfrm>
-            <a:off x="1524000" y="3602038"/>
+            <a:off x="2007424" y="3726688"/>
             <a:ext cx="9144000" cy="1655762"/>
           </a:xfrm>
         </p:spPr>
@@ -1799,14 +2064,19 @@
             <p:ph type="dt" sz="half" idx="10"/>
           </p:nvPr>
         </p:nvSpPr>
-        <p:spPr/>
+        <p:spPr>
+          <a:xfrm>
+            <a:off x="966848" y="6489947"/>
+            <a:ext cx="2743200" cy="365125"/>
+          </a:xfrm>
+        </p:spPr>
         <p:txBody>
           <a:bodyPr/>
           <a:lstStyle/>
           <a:p>
-            <a:fld id="{D884633D-11AC-4888-94B9-297E606567D1}" type="datetimeFigureOut">
+            <a:fld id="{90731ABD-EBC2-433F-B58F-CADA0E63E927}" type="datetime1">
               <a:rPr lang="en-GB" smtClean="0"/>
-              <a:t>04/05/2020</a:t>
+              <a:t>06/05/2020</a:t>
             </a:fld>
             <a:endParaRPr lang="en-GB"/>
           </a:p>
@@ -1828,7 +2098,12 @@
             <p:ph type="ftr" sz="quarter" idx="11"/>
           </p:nvPr>
         </p:nvSpPr>
-        <p:spPr/>
+        <p:spPr>
+          <a:xfrm>
+            <a:off x="4522024" y="6484091"/>
+            <a:ext cx="4114800" cy="365125"/>
+          </a:xfrm>
+        </p:spPr>
         <p:txBody>
           <a:bodyPr/>
           <a:lstStyle/>
@@ -1853,7 +2128,12 @@
             <p:ph type="sldNum" sz="quarter" idx="12"/>
           </p:nvPr>
         </p:nvSpPr>
-        <p:spPr/>
+        <p:spPr>
+          <a:xfrm>
+            <a:off x="9448800" y="6492875"/>
+            <a:ext cx="2743200" cy="365125"/>
+          </a:xfrm>
+        </p:spPr>
         <p:txBody>
           <a:bodyPr/>
           <a:lstStyle/>
@@ -2004,9 +2284,9 @@
           <a:bodyPr/>
           <a:lstStyle/>
           <a:p>
-            <a:fld id="{D884633D-11AC-4888-94B9-297E606567D1}" type="datetimeFigureOut">
+            <a:fld id="{BB6521CB-2C73-41D6-A5E0-A3CBE094B6E1}" type="datetime1">
               <a:rPr lang="en-GB" smtClean="0"/>
-              <a:t>04/05/2020</a:t>
+              <a:t>06/05/2020</a:t>
             </a:fld>
             <a:endParaRPr lang="en-GB"/>
           </a:p>
@@ -2114,7 +2394,7 @@
         </p:nvSpPr>
         <p:spPr>
           <a:xfrm>
-            <a:off x="8724900" y="365125"/>
+            <a:off x="9223665" y="365125"/>
             <a:ext cx="2628900" cy="5811838"/>
           </a:xfrm>
         </p:spPr>
@@ -2148,7 +2428,7 @@
         </p:nvSpPr>
         <p:spPr>
           <a:xfrm>
-            <a:off x="838200" y="365125"/>
+            <a:off x="1336965" y="365125"/>
             <a:ext cx="7734300" cy="5811838"/>
           </a:xfrm>
         </p:spPr>
@@ -2214,9 +2494,9 @@
           <a:bodyPr/>
           <a:lstStyle/>
           <a:p>
-            <a:fld id="{D884633D-11AC-4888-94B9-297E606567D1}" type="datetimeFigureOut">
+            <a:fld id="{319A7181-5B74-44BF-AD18-F5DE3421F803}" type="datetime1">
               <a:rPr lang="en-GB" smtClean="0"/>
-              <a:t>04/05/2020</a:t>
+              <a:t>06/05/2020</a:t>
             </a:fld>
             <a:endParaRPr lang="en-GB"/>
           </a:p>
@@ -2409,14 +2689,19 @@
             <p:ph type="dt" sz="half" idx="10"/>
           </p:nvPr>
         </p:nvSpPr>
-        <p:spPr/>
+        <p:spPr>
+          <a:xfrm>
+            <a:off x="952005" y="6492875"/>
+            <a:ext cx="2743200" cy="365125"/>
+          </a:xfrm>
+        </p:spPr>
         <p:txBody>
           <a:bodyPr/>
           <a:lstStyle/>
           <a:p>
-            <a:fld id="{D884633D-11AC-4888-94B9-297E606567D1}" type="datetimeFigureOut">
+            <a:fld id="{D0C410B8-84C1-4E9C-B4AB-BBB25FED2D2D}" type="datetime1">
               <a:rPr lang="en-GB" smtClean="0"/>
-              <a:t>04/05/2020</a:t>
+              <a:t>06/05/2020</a:t>
             </a:fld>
             <a:endParaRPr lang="en-GB"/>
           </a:p>
@@ -2438,7 +2723,12 @@
             <p:ph type="ftr" sz="quarter" idx="11"/>
           </p:nvPr>
         </p:nvSpPr>
-        <p:spPr/>
+        <p:spPr>
+          <a:xfrm>
+            <a:off x="4514602" y="6492873"/>
+            <a:ext cx="4114800" cy="365125"/>
+          </a:xfrm>
+        </p:spPr>
         <p:txBody>
           <a:bodyPr/>
           <a:lstStyle/>
@@ -2463,7 +2753,12 @@
             <p:ph type="sldNum" sz="quarter" idx="12"/>
           </p:nvPr>
         </p:nvSpPr>
-        <p:spPr/>
+        <p:spPr>
+          <a:xfrm>
+            <a:off x="11673444" y="6492874"/>
+            <a:ext cx="518556" cy="365125"/>
+          </a:xfrm>
+        </p:spPr>
         <p:txBody>
           <a:bodyPr/>
           <a:lstStyle/>
@@ -2524,7 +2819,7 @@
         </p:nvSpPr>
         <p:spPr>
           <a:xfrm>
-            <a:off x="831850" y="1709738"/>
+            <a:off x="1306865" y="1709738"/>
             <a:ext cx="10515600" cy="2852737"/>
           </a:xfrm>
         </p:spPr>
@@ -2562,7 +2857,7 @@
         </p:nvSpPr>
         <p:spPr>
           <a:xfrm>
-            <a:off x="831850" y="4589463"/>
+            <a:off x="1306865" y="4589463"/>
             <a:ext cx="10515600" cy="1500187"/>
           </a:xfrm>
         </p:spPr>
@@ -2690,9 +2985,9 @@
           <a:bodyPr/>
           <a:lstStyle/>
           <a:p>
-            <a:fld id="{D884633D-11AC-4888-94B9-297E606567D1}" type="datetimeFigureOut">
+            <a:fld id="{296A06AC-1C6A-47B9-BCE2-5F048AA16EE3}" type="datetime1">
               <a:rPr lang="en-GB" smtClean="0"/>
-              <a:t>04/05/2020</a:t>
+              <a:t>06/05/2020</a:t>
             </a:fld>
             <a:endParaRPr lang="en-GB"/>
           </a:p>
@@ -2829,7 +3124,7 @@
         </p:nvSpPr>
         <p:spPr>
           <a:xfrm>
-            <a:off x="838200" y="1825625"/>
+            <a:off x="1289465" y="1825625"/>
             <a:ext cx="5181600" cy="4351338"/>
           </a:xfrm>
         </p:spPr>
@@ -2892,7 +3187,7 @@
         </p:nvSpPr>
         <p:spPr>
           <a:xfrm>
-            <a:off x="6172200" y="1825625"/>
+            <a:off x="6623465" y="1825625"/>
             <a:ext cx="5181600" cy="4351338"/>
           </a:xfrm>
         </p:spPr>
@@ -2958,9 +3253,9 @@
           <a:bodyPr/>
           <a:lstStyle/>
           <a:p>
-            <a:fld id="{D884633D-11AC-4888-94B9-297E606567D1}" type="datetimeFigureOut">
+            <a:fld id="{D6753E84-0301-4FFC-872F-2643339CA3A4}" type="datetime1">
               <a:rPr lang="en-GB" smtClean="0"/>
-              <a:t>04/05/2020</a:t>
+              <a:t>06/05/2020</a:t>
             </a:fld>
             <a:endParaRPr lang="en-GB"/>
           </a:p>
@@ -3068,8 +3363,8 @@
         </p:nvSpPr>
         <p:spPr>
           <a:xfrm>
-            <a:off x="839788" y="365125"/>
-            <a:ext cx="10515600" cy="1325563"/>
+            <a:off x="952005" y="329500"/>
+            <a:ext cx="11239995" cy="1325563"/>
           </a:xfrm>
         </p:spPr>
         <p:txBody>
@@ -3102,7 +3397,7 @@
         </p:nvSpPr>
         <p:spPr>
           <a:xfrm>
-            <a:off x="839788" y="1681163"/>
+            <a:off x="1314802" y="1681163"/>
             <a:ext cx="5157787" cy="823912"/>
           </a:xfrm>
         </p:spPr>
@@ -3173,7 +3468,7 @@
         </p:nvSpPr>
         <p:spPr>
           <a:xfrm>
-            <a:off x="839788" y="2505075"/>
+            <a:off x="1314802" y="2505075"/>
             <a:ext cx="5157787" cy="3684588"/>
           </a:xfrm>
         </p:spPr>
@@ -3236,7 +3531,7 @@
         </p:nvSpPr>
         <p:spPr>
           <a:xfrm>
-            <a:off x="6172200" y="1681163"/>
+            <a:off x="6647214" y="1681163"/>
             <a:ext cx="5183188" cy="823912"/>
           </a:xfrm>
         </p:spPr>
@@ -3307,7 +3602,7 @@
         </p:nvSpPr>
         <p:spPr>
           <a:xfrm>
-            <a:off x="6172200" y="2505075"/>
+            <a:off x="6647214" y="2505075"/>
             <a:ext cx="5183188" cy="3684588"/>
           </a:xfrm>
         </p:spPr>
@@ -3373,9 +3668,9 @@
           <a:bodyPr/>
           <a:lstStyle/>
           <a:p>
-            <a:fld id="{D884633D-11AC-4888-94B9-297E606567D1}" type="datetimeFigureOut">
+            <a:fld id="{937A7960-54CC-42D4-BCDB-E08C43EF06AF}" type="datetime1">
               <a:rPr lang="en-GB" smtClean="0"/>
-              <a:t>04/05/2020</a:t>
+              <a:t>06/05/2020</a:t>
             </a:fld>
             <a:endParaRPr lang="en-GB"/>
           </a:p>
@@ -3515,9 +3810,9 @@
           <a:bodyPr/>
           <a:lstStyle/>
           <a:p>
-            <a:fld id="{D884633D-11AC-4888-94B9-297E606567D1}" type="datetimeFigureOut">
+            <a:fld id="{DC4D10A3-8637-4790-B12B-8FD8E1420A99}" type="datetime1">
               <a:rPr lang="en-GB" smtClean="0"/>
-              <a:t>04/05/2020</a:t>
+              <a:t>06/05/2020</a:t>
             </a:fld>
             <a:endParaRPr lang="en-GB"/>
           </a:p>
@@ -3628,9 +3923,9 @@
           <a:bodyPr/>
           <a:lstStyle/>
           <a:p>
-            <a:fld id="{D884633D-11AC-4888-94B9-297E606567D1}" type="datetimeFigureOut">
+            <a:fld id="{F7CC06EA-8135-4DC5-BA0A-28CCC05DEFA0}" type="datetime1">
               <a:rPr lang="en-GB" smtClean="0"/>
-              <a:t>04/05/2020</a:t>
+              <a:t>06/05/2020</a:t>
             </a:fld>
             <a:endParaRPr lang="en-GB"/>
           </a:p>
@@ -3738,7 +4033,7 @@
         </p:nvSpPr>
         <p:spPr>
           <a:xfrm>
-            <a:off x="839788" y="457200"/>
+            <a:off x="1338555" y="457200"/>
             <a:ext cx="3932237" cy="1600200"/>
           </a:xfrm>
         </p:spPr>
@@ -3776,7 +4071,7 @@
         </p:nvSpPr>
         <p:spPr>
           <a:xfrm>
-            <a:off x="5183188" y="987425"/>
+            <a:off x="5681955" y="987425"/>
             <a:ext cx="6172200" cy="4873625"/>
           </a:xfrm>
         </p:spPr>
@@ -3867,7 +4162,7 @@
         </p:nvSpPr>
         <p:spPr>
           <a:xfrm>
-            <a:off x="839788" y="2057400"/>
+            <a:off x="1338555" y="2057400"/>
             <a:ext cx="3932237" cy="3811588"/>
           </a:xfrm>
         </p:spPr>
@@ -3941,9 +4236,9 @@
           <a:bodyPr/>
           <a:lstStyle/>
           <a:p>
-            <a:fld id="{D884633D-11AC-4888-94B9-297E606567D1}" type="datetimeFigureOut">
+            <a:fld id="{BFB38DAA-A929-4F83-90EF-F41A94A7AEBF}" type="datetime1">
               <a:rPr lang="en-GB" smtClean="0"/>
-              <a:t>04/05/2020</a:t>
+              <a:t>06/05/2020</a:t>
             </a:fld>
             <a:endParaRPr lang="en-GB"/>
           </a:p>
@@ -4051,7 +4346,7 @@
         </p:nvSpPr>
         <p:spPr>
           <a:xfrm>
-            <a:off x="839788" y="457200"/>
+            <a:off x="1338555" y="457200"/>
             <a:ext cx="3932237" cy="1600200"/>
           </a:xfrm>
         </p:spPr>
@@ -4089,7 +4384,7 @@
         </p:nvSpPr>
         <p:spPr>
           <a:xfrm>
-            <a:off x="5183188" y="987425"/>
+            <a:off x="5681955" y="987425"/>
             <a:ext cx="6172200" cy="4873625"/>
           </a:xfrm>
         </p:spPr>
@@ -4156,7 +4451,7 @@
         </p:nvSpPr>
         <p:spPr>
           <a:xfrm>
-            <a:off x="839788" y="2057400"/>
+            <a:off x="1338555" y="2057400"/>
             <a:ext cx="3932237" cy="3811588"/>
           </a:xfrm>
         </p:spPr>
@@ -4230,9 +4525,9 @@
           <a:bodyPr/>
           <a:lstStyle/>
           <a:p>
-            <a:fld id="{D884633D-11AC-4888-94B9-297E606567D1}" type="datetimeFigureOut">
+            <a:fld id="{A5C3BC09-303C-492E-88C1-49700F40A5AD}" type="datetime1">
               <a:rPr lang="en-GB" smtClean="0"/>
-              <a:t>04/05/2020</a:t>
+              <a:t>06/05/2020</a:t>
             </a:fld>
             <a:endParaRPr lang="en-GB"/>
           </a:p>
@@ -4354,8 +4649,8 @@
         </p:nvSpPr>
         <p:spPr>
           <a:xfrm>
-            <a:off x="838200" y="365125"/>
-            <a:ext cx="10515600" cy="1325563"/>
+            <a:off x="952005" y="489774"/>
+            <a:ext cx="11239995" cy="1325563"/>
           </a:xfrm>
           <a:prstGeom prst="rect">
             <a:avLst/>
@@ -4393,8 +4688,8 @@
         </p:nvSpPr>
         <p:spPr>
           <a:xfrm>
-            <a:off x="838200" y="1825625"/>
-            <a:ext cx="10515600" cy="4351338"/>
+            <a:off x="952005" y="1962150"/>
+            <a:ext cx="11239995" cy="4351338"/>
           </a:xfrm>
           <a:prstGeom prst="rect">
             <a:avLst/>
@@ -4461,7 +4756,7 @@
         </p:nvSpPr>
         <p:spPr>
           <a:xfrm>
-            <a:off x="838200" y="6356350"/>
+            <a:off x="952005" y="6492875"/>
             <a:ext cx="2743200" cy="365125"/>
           </a:xfrm>
           <a:prstGeom prst="rect">
@@ -4474,17 +4769,18 @@
             <a:lvl1pPr algn="l">
               <a:defRPr sz="1200">
                 <a:solidFill>
-                  <a:schemeClr val="tx1">
-                    <a:tint val="75000"/>
+                  <a:schemeClr val="bg1">
+                    <a:lumMod val="95000"/>
                   </a:schemeClr>
                 </a:solidFill>
+                <a:latin typeface="Consolas" panose="020B0609020204030204" pitchFamily="49" charset="0"/>
               </a:defRPr>
             </a:lvl1pPr>
           </a:lstStyle>
           <a:p>
-            <a:fld id="{D884633D-11AC-4888-94B9-297E606567D1}" type="datetimeFigureOut">
+            <a:fld id="{81F60144-7850-46D0-A9C3-9B5CC4C07D04}" type="datetime1">
               <a:rPr lang="en-GB" smtClean="0"/>
-              <a:t>04/05/2020</a:t>
+              <a:t>06/05/2020</a:t>
             </a:fld>
             <a:endParaRPr lang="en-GB"/>
           </a:p>
@@ -4508,7 +4804,7 @@
         </p:nvSpPr>
         <p:spPr>
           <a:xfrm>
-            <a:off x="4038600" y="6356350"/>
+            <a:off x="4514602" y="6480999"/>
             <a:ext cx="4114800" cy="365125"/>
           </a:xfrm>
           <a:prstGeom prst="rect">
@@ -4521,10 +4817,11 @@
             <a:lvl1pPr algn="ctr">
               <a:defRPr sz="1200">
                 <a:solidFill>
-                  <a:schemeClr val="tx1">
-                    <a:tint val="75000"/>
+                  <a:schemeClr val="bg1">
+                    <a:lumMod val="95000"/>
                   </a:schemeClr>
                 </a:solidFill>
+                <a:latin typeface="Consolas" panose="020B0609020204030204" pitchFamily="49" charset="0"/>
               </a:defRPr>
             </a:lvl1pPr>
           </a:lstStyle>
@@ -4551,8 +4848,8 @@
         </p:nvSpPr>
         <p:spPr>
           <a:xfrm>
-            <a:off x="8610600" y="6356350"/>
-            <a:ext cx="2743200" cy="365125"/>
+            <a:off x="11697195" y="6492874"/>
+            <a:ext cx="494805" cy="365125"/>
           </a:xfrm>
           <a:prstGeom prst="rect">
             <a:avLst/>
@@ -4564,16 +4861,18 @@
             <a:lvl1pPr algn="r">
               <a:defRPr sz="1200">
                 <a:solidFill>
-                  <a:schemeClr val="tx1">
-                    <a:tint val="75000"/>
+                  <a:schemeClr val="bg1">
+                    <a:lumMod val="95000"/>
                   </a:schemeClr>
                 </a:solidFill>
+                <a:latin typeface="Consolas" panose="020B0609020204030204" pitchFamily="49" charset="0"/>
               </a:defRPr>
             </a:lvl1pPr>
           </a:lstStyle>
           <a:p>
             <a:fld id="{44F922D5-DBBB-4193-BE70-B740CC9842E5}" type="slidenum">
               <a:rPr lang="en-GB" smtClean="0"/>
+              <a:pPr/>
               <a:t>‹#›</a:t>
             </a:fld>
             <a:endParaRPr lang="en-GB"/>
@@ -4601,6 +4900,7 @@
     <p:sldLayoutId id="2147483658" r:id="rId10"/>
     <p:sldLayoutId id="2147483659" r:id="rId11"/>
   </p:sldLayoutIdLst>
+  <p:hf hdr="0" ftr="0" dt="0"/>
   <p:txStyles>
     <p:titleStyle>
       <a:lvl1pPr algn="l" defTabSz="914400" rtl="0" eaLnBrk="1" latinLnBrk="0" hangingPunct="1">
@@ -4613,9 +4913,9 @@
         <a:buNone/>
         <a:defRPr sz="4400" kern="1200">
           <a:solidFill>
-            <a:schemeClr val="tx1"/>
+            <a:schemeClr val="bg2"/>
           </a:solidFill>
-          <a:latin typeface="+mj-lt"/>
+          <a:latin typeface="Arial Nova" panose="020B0504020202020204" pitchFamily="34" charset="0"/>
           <a:ea typeface="+mj-ea"/>
           <a:cs typeface="+mj-cs"/>
         </a:defRPr>
@@ -4633,9 +4933,9 @@
         <a:buChar char="•"/>
         <a:defRPr sz="2800" kern="1200">
           <a:solidFill>
-            <a:schemeClr val="tx1"/>
+            <a:schemeClr val="bg2"/>
           </a:solidFill>
-          <a:latin typeface="+mn-lt"/>
+          <a:latin typeface="Arial Nova" panose="020B0504020202020204" pitchFamily="34" charset="0"/>
           <a:ea typeface="+mn-ea"/>
           <a:cs typeface="+mn-cs"/>
         </a:defRPr>
@@ -4651,9 +4951,9 @@
         <a:buChar char="•"/>
         <a:defRPr sz="2400" kern="1200">
           <a:solidFill>
-            <a:schemeClr val="tx1"/>
+            <a:schemeClr val="bg2"/>
           </a:solidFill>
-          <a:latin typeface="+mn-lt"/>
+          <a:latin typeface="Arial Nova" panose="020B0504020202020204" pitchFamily="34" charset="0"/>
           <a:ea typeface="+mn-ea"/>
           <a:cs typeface="+mn-cs"/>
         </a:defRPr>
@@ -4669,9 +4969,9 @@
         <a:buChar char="•"/>
         <a:defRPr sz="2000" kern="1200">
           <a:solidFill>
-            <a:schemeClr val="tx1"/>
+            <a:schemeClr val="bg2"/>
           </a:solidFill>
-          <a:latin typeface="+mn-lt"/>
+          <a:latin typeface="Arial Nova" panose="020B0504020202020204" pitchFamily="34" charset="0"/>
           <a:ea typeface="+mn-ea"/>
           <a:cs typeface="+mn-cs"/>
         </a:defRPr>
@@ -4687,9 +4987,9 @@
         <a:buChar char="•"/>
         <a:defRPr sz="1800" kern="1200">
           <a:solidFill>
-            <a:schemeClr val="tx1"/>
+            <a:schemeClr val="bg2"/>
           </a:solidFill>
-          <a:latin typeface="+mn-lt"/>
+          <a:latin typeface="Arial Nova" panose="020B0504020202020204" pitchFamily="34" charset="0"/>
           <a:ea typeface="+mn-ea"/>
           <a:cs typeface="+mn-cs"/>
         </a:defRPr>
@@ -4705,9 +5005,9 @@
         <a:buChar char="•"/>
         <a:defRPr sz="1800" kern="1200">
           <a:solidFill>
-            <a:schemeClr val="tx1"/>
+            <a:schemeClr val="bg2"/>
           </a:solidFill>
-          <a:latin typeface="+mn-lt"/>
+          <a:latin typeface="Arial Nova" panose="020B0504020202020204" pitchFamily="34" charset="0"/>
           <a:ea typeface="+mn-ea"/>
           <a:cs typeface="+mn-cs"/>
         </a:defRPr>
@@ -5223,6 +5523,35 @@
           </a:p>
         </p:txBody>
       </p:sp>
+      <p:sp>
+        <p:nvSpPr>
+          <p:cNvPr id="4" name="Slide Number Placeholder 3">
+            <a:extLst>
+              <a:ext uri="{FF2B5EF4-FFF2-40B4-BE49-F238E27FC236}">
+                <a16:creationId xmlns:a16="http://schemas.microsoft.com/office/drawing/2014/main" id="{DF17BD6F-5EC3-42E2-B061-A46734EB9308}"/>
+              </a:ext>
+            </a:extLst>
+          </p:cNvPr>
+          <p:cNvSpPr>
+            <a:spLocks noGrp="1"/>
+          </p:cNvSpPr>
+          <p:nvPr>
+            <p:ph type="sldNum" sz="quarter" idx="12"/>
+          </p:nvPr>
+        </p:nvSpPr>
+        <p:spPr/>
+        <p:txBody>
+          <a:bodyPr/>
+          <a:lstStyle/>
+          <a:p>
+            <a:fld id="{44F922D5-DBBB-4193-BE70-B740CC9842E5}" type="slidenum">
+              <a:rPr lang="en-GB" smtClean="0"/>
+              <a:t>2</a:t>
+            </a:fld>
+            <a:endParaRPr lang="en-GB"/>
+          </a:p>
+        </p:txBody>
+      </p:sp>
     </p:spTree>
     <p:extLst>
       <p:ext uri="{BB962C8B-B14F-4D97-AF65-F5344CB8AC3E}">
@@ -5343,6 +5672,35 @@
               <a:t>&lt;key concept&gt;</a:t>
             </a:r>
             <a:endParaRPr lang="en-GB" dirty="0"/>
+          </a:p>
+        </p:txBody>
+      </p:sp>
+      <p:sp>
+        <p:nvSpPr>
+          <p:cNvPr id="2" name="Slide Number Placeholder 1">
+            <a:extLst>
+              <a:ext uri="{FF2B5EF4-FFF2-40B4-BE49-F238E27FC236}">
+                <a16:creationId xmlns:a16="http://schemas.microsoft.com/office/drawing/2014/main" id="{FF8B1EDC-6C77-4197-B6C2-2D602679E956}"/>
+              </a:ext>
+            </a:extLst>
+          </p:cNvPr>
+          <p:cNvSpPr>
+            <a:spLocks noGrp="1"/>
+          </p:cNvSpPr>
+          <p:nvPr>
+            <p:ph type="sldNum" sz="quarter" idx="12"/>
+          </p:nvPr>
+        </p:nvSpPr>
+        <p:spPr/>
+        <p:txBody>
+          <a:bodyPr/>
+          <a:lstStyle/>
+          <a:p>
+            <a:fld id="{44F922D5-DBBB-4193-BE70-B740CC9842E5}" type="slidenum">
+              <a:rPr lang="en-GB" smtClean="0"/>
+              <a:t>3</a:t>
+            </a:fld>
+            <a:endParaRPr lang="en-GB"/>
           </a:p>
         </p:txBody>
       </p:sp>
@@ -5731,6 +6089,35 @@
           </a:p>
         </p:txBody>
       </p:sp>
+      <p:sp>
+        <p:nvSpPr>
+          <p:cNvPr id="2" name="Slide Number Placeholder 1">
+            <a:extLst>
+              <a:ext uri="{FF2B5EF4-FFF2-40B4-BE49-F238E27FC236}">
+                <a16:creationId xmlns:a16="http://schemas.microsoft.com/office/drawing/2014/main" id="{4819A467-EB4B-46FB-BBC1-89E7ED6000E2}"/>
+              </a:ext>
+            </a:extLst>
+          </p:cNvPr>
+          <p:cNvSpPr>
+            <a:spLocks noGrp="1"/>
+          </p:cNvSpPr>
+          <p:nvPr>
+            <p:ph type="sldNum" sz="quarter" idx="12"/>
+          </p:nvPr>
+        </p:nvSpPr>
+        <p:spPr/>
+        <p:txBody>
+          <a:bodyPr/>
+          <a:lstStyle/>
+          <a:p>
+            <a:fld id="{44F922D5-DBBB-4193-BE70-B740CC9842E5}" type="slidenum">
+              <a:rPr lang="en-GB" smtClean="0"/>
+              <a:t>4</a:t>
+            </a:fld>
+            <a:endParaRPr lang="en-GB"/>
+          </a:p>
+        </p:txBody>
+      </p:sp>
     </p:spTree>
     <p:extLst>
       <p:ext uri="{BB962C8B-B14F-4D97-AF65-F5344CB8AC3E}">
@@ -5851,6 +6238,35 @@
           </a:extLst>
         </p:spPr>
       </p:pic>
+      <p:sp>
+        <p:nvSpPr>
+          <p:cNvPr id="2" name="Slide Number Placeholder 1">
+            <a:extLst>
+              <a:ext uri="{FF2B5EF4-FFF2-40B4-BE49-F238E27FC236}">
+                <a16:creationId xmlns:a16="http://schemas.microsoft.com/office/drawing/2014/main" id="{6DDF4E12-8FF6-4ADC-8AF4-F321F8D632CD}"/>
+              </a:ext>
+            </a:extLst>
+          </p:cNvPr>
+          <p:cNvSpPr>
+            <a:spLocks noGrp="1"/>
+          </p:cNvSpPr>
+          <p:nvPr>
+            <p:ph type="sldNum" sz="quarter" idx="12"/>
+          </p:nvPr>
+        </p:nvSpPr>
+        <p:spPr/>
+        <p:txBody>
+          <a:bodyPr/>
+          <a:lstStyle/>
+          <a:p>
+            <a:fld id="{44F922D5-DBBB-4193-BE70-B740CC9842E5}" type="slidenum">
+              <a:rPr lang="en-GB" smtClean="0"/>
+              <a:t>5</a:t>
+            </a:fld>
+            <a:endParaRPr lang="en-GB"/>
+          </a:p>
+        </p:txBody>
+      </p:sp>
     </p:spTree>
     <p:extLst>
       <p:ext uri="{BB962C8B-B14F-4D97-AF65-F5344CB8AC3E}">
@@ -5991,6 +6407,35 @@
               </a:solidFill>
               <a:latin typeface="Arial Nova Light" panose="020B0304020202020204" pitchFamily="34" charset="0"/>
             </a:endParaRPr>
+          </a:p>
+        </p:txBody>
+      </p:sp>
+      <p:sp>
+        <p:nvSpPr>
+          <p:cNvPr id="2" name="Slide Number Placeholder 1">
+            <a:extLst>
+              <a:ext uri="{FF2B5EF4-FFF2-40B4-BE49-F238E27FC236}">
+                <a16:creationId xmlns:a16="http://schemas.microsoft.com/office/drawing/2014/main" id="{E473096D-A30D-4C6A-BF79-9EB112512A79}"/>
+              </a:ext>
+            </a:extLst>
+          </p:cNvPr>
+          <p:cNvSpPr>
+            <a:spLocks noGrp="1"/>
+          </p:cNvSpPr>
+          <p:nvPr>
+            <p:ph type="sldNum" sz="quarter" idx="12"/>
+          </p:nvPr>
+        </p:nvSpPr>
+        <p:spPr/>
+        <p:txBody>
+          <a:bodyPr/>
+          <a:lstStyle/>
+          <a:p>
+            <a:fld id="{44F922D5-DBBB-4193-BE70-B740CC9842E5}" type="slidenum">
+              <a:rPr lang="en-GB" smtClean="0"/>
+              <a:t>6</a:t>
+            </a:fld>
+            <a:endParaRPr lang="en-GB"/>
           </a:p>
         </p:txBody>
       </p:sp>
@@ -6075,6 +6520,35 @@
           </p:pic>
         </mc:Fallback>
       </mc:AlternateContent>
+      <p:sp>
+        <p:nvSpPr>
+          <p:cNvPr id="2" name="Slide Number Placeholder 1">
+            <a:extLst>
+              <a:ext uri="{FF2B5EF4-FFF2-40B4-BE49-F238E27FC236}">
+                <a16:creationId xmlns:a16="http://schemas.microsoft.com/office/drawing/2014/main" id="{DAC67B46-6493-4536-8742-98DBC603997F}"/>
+              </a:ext>
+            </a:extLst>
+          </p:cNvPr>
+          <p:cNvSpPr>
+            <a:spLocks noGrp="1"/>
+          </p:cNvSpPr>
+          <p:nvPr>
+            <p:ph type="sldNum" sz="quarter" idx="12"/>
+          </p:nvPr>
+        </p:nvSpPr>
+        <p:spPr/>
+        <p:txBody>
+          <a:bodyPr/>
+          <a:lstStyle/>
+          <a:p>
+            <a:fld id="{44F922D5-DBBB-4193-BE70-B740CC9842E5}" type="slidenum">
+              <a:rPr lang="en-GB" smtClean="0"/>
+              <a:t>7</a:t>
+            </a:fld>
+            <a:endParaRPr lang="en-GB"/>
+          </a:p>
+        </p:txBody>
+      </p:sp>
     </p:spTree>
     <p:extLst>
       <p:ext uri="{BB962C8B-B14F-4D97-AF65-F5344CB8AC3E}">

</xml_diff>

<commit_message>
characterisation class material and seminar pptx
</commit_message>
<xml_diff>
--- a/0.Miscellaneous/PPT_resources/pptTemplate.pptx
+++ b/0.Miscellaneous/PPT_resources/pptTemplate.pptx
@@ -178,7 +178,7 @@
 <file path=ppt/revisionInfo.xml><?xml version="1.0" encoding="utf-8"?>
 <p1510:revInfo xmlns:a="http://schemas.openxmlformats.org/drawingml/2006/main" xmlns:r="http://schemas.openxmlformats.org/officeDocument/2006/relationships" xmlns:p1510="http://schemas.microsoft.com/office/powerpoint/2015/10/main">
   <p1510:revLst>
-    <p1510:client id="{D962D6D7-454A-41C7-98A7-DA876A9E1509}" v="33" dt="2020-05-06T18:01:03.268"/>
+    <p1510:client id="{D962D6D7-454A-41C7-98A7-DA876A9E1509}" v="34" dt="2020-05-07T16:59:37.112"/>
   </p1510:revLst>
 </p1510:revInfo>
 </file>
@@ -972,7 +972,7 @@
   <pc:docChgLst>
     <pc:chgData name="Antonio Osamu Katagiri Tanaka" userId="2c28225e-d492-4964-8551-1b0a3c65dda0" providerId="ADAL" clId="{D962D6D7-454A-41C7-98A7-DA876A9E1509}"/>
     <pc:docChg chg="undo custSel modSld modMainMaster">
-      <pc:chgData name="Antonio Osamu Katagiri Tanaka" userId="2c28225e-d492-4964-8551-1b0a3c65dda0" providerId="ADAL" clId="{D962D6D7-454A-41C7-98A7-DA876A9E1509}" dt="2020-05-06T18:02:23.988" v="291" actId="1076"/>
+      <pc:chgData name="Antonio Osamu Katagiri Tanaka" userId="2c28225e-d492-4964-8551-1b0a3c65dda0" providerId="ADAL" clId="{D962D6D7-454A-41C7-98A7-DA876A9E1509}" dt="2020-05-07T16:59:39.076" v="294" actId="113"/>
       <pc:docMkLst>
         <pc:docMk/>
       </pc:docMkLst>
@@ -996,6 +996,21 @@
             <pc:docMk/>
             <pc:sldMk cId="3401248549" sldId="256"/>
             <ac:spMk id="7" creationId="{8D0BEDFD-CE79-4A45-9ADE-72FBEA303FCC}"/>
+          </ac:spMkLst>
+        </pc:spChg>
+      </pc:sldChg>
+      <pc:sldChg chg="modSp mod">
+        <pc:chgData name="Antonio Osamu Katagiri Tanaka" userId="2c28225e-d492-4964-8551-1b0a3c65dda0" providerId="ADAL" clId="{D962D6D7-454A-41C7-98A7-DA876A9E1509}" dt="2020-05-07T16:59:39.076" v="294" actId="113"/>
+        <pc:sldMkLst>
+          <pc:docMk/>
+          <pc:sldMk cId="4056039362" sldId="260"/>
+        </pc:sldMkLst>
+        <pc:spChg chg="mod">
+          <ac:chgData name="Antonio Osamu Katagiri Tanaka" userId="2c28225e-d492-4964-8551-1b0a3c65dda0" providerId="ADAL" clId="{D962D6D7-454A-41C7-98A7-DA876A9E1509}" dt="2020-05-07T16:59:39.076" v="294" actId="113"/>
+          <ac:spMkLst>
+            <pc:docMk/>
+            <pc:sldMk cId="4056039362" sldId="260"/>
+            <ac:spMk id="14" creationId="{B1FDEF3E-1872-41D3-A841-FBE14801F476}"/>
           </ac:spMkLst>
         </pc:spChg>
       </pc:sldChg>
@@ -1563,7 +1578,7 @@
           <a:p>
             <a:fld id="{1B402B64-CAC4-4D07-834F-F232921309C8}" type="datetimeFigureOut">
               <a:rPr lang="en-GB" smtClean="0"/>
-              <a:t>06/05/2020</a:t>
+              <a:t>07/05/2020</a:t>
             </a:fld>
             <a:endParaRPr lang="en-GB"/>
           </a:p>
@@ -2076,7 +2091,7 @@
           <a:p>
             <a:fld id="{90731ABD-EBC2-433F-B58F-CADA0E63E927}" type="datetime1">
               <a:rPr lang="en-GB" smtClean="0"/>
-              <a:t>06/05/2020</a:t>
+              <a:t>07/05/2020</a:t>
             </a:fld>
             <a:endParaRPr lang="en-GB"/>
           </a:p>
@@ -2286,7 +2301,7 @@
           <a:p>
             <a:fld id="{BB6521CB-2C73-41D6-A5E0-A3CBE094B6E1}" type="datetime1">
               <a:rPr lang="en-GB" smtClean="0"/>
-              <a:t>06/05/2020</a:t>
+              <a:t>07/05/2020</a:t>
             </a:fld>
             <a:endParaRPr lang="en-GB"/>
           </a:p>
@@ -2496,7 +2511,7 @@
           <a:p>
             <a:fld id="{319A7181-5B74-44BF-AD18-F5DE3421F803}" type="datetime1">
               <a:rPr lang="en-GB" smtClean="0"/>
-              <a:t>06/05/2020</a:t>
+              <a:t>07/05/2020</a:t>
             </a:fld>
             <a:endParaRPr lang="en-GB"/>
           </a:p>
@@ -2701,7 +2716,7 @@
           <a:p>
             <a:fld id="{D0C410B8-84C1-4E9C-B4AB-BBB25FED2D2D}" type="datetime1">
               <a:rPr lang="en-GB" smtClean="0"/>
-              <a:t>06/05/2020</a:t>
+              <a:t>07/05/2020</a:t>
             </a:fld>
             <a:endParaRPr lang="en-GB"/>
           </a:p>
@@ -2987,7 +3002,7 @@
           <a:p>
             <a:fld id="{296A06AC-1C6A-47B9-BCE2-5F048AA16EE3}" type="datetime1">
               <a:rPr lang="en-GB" smtClean="0"/>
-              <a:t>06/05/2020</a:t>
+              <a:t>07/05/2020</a:t>
             </a:fld>
             <a:endParaRPr lang="en-GB"/>
           </a:p>
@@ -3255,7 +3270,7 @@
           <a:p>
             <a:fld id="{D6753E84-0301-4FFC-872F-2643339CA3A4}" type="datetime1">
               <a:rPr lang="en-GB" smtClean="0"/>
-              <a:t>06/05/2020</a:t>
+              <a:t>07/05/2020</a:t>
             </a:fld>
             <a:endParaRPr lang="en-GB"/>
           </a:p>
@@ -3670,7 +3685,7 @@
           <a:p>
             <a:fld id="{937A7960-54CC-42D4-BCDB-E08C43EF06AF}" type="datetime1">
               <a:rPr lang="en-GB" smtClean="0"/>
-              <a:t>06/05/2020</a:t>
+              <a:t>07/05/2020</a:t>
             </a:fld>
             <a:endParaRPr lang="en-GB"/>
           </a:p>
@@ -3812,7 +3827,7 @@
           <a:p>
             <a:fld id="{DC4D10A3-8637-4790-B12B-8FD8E1420A99}" type="datetime1">
               <a:rPr lang="en-GB" smtClean="0"/>
-              <a:t>06/05/2020</a:t>
+              <a:t>07/05/2020</a:t>
             </a:fld>
             <a:endParaRPr lang="en-GB"/>
           </a:p>
@@ -3925,7 +3940,7 @@
           <a:p>
             <a:fld id="{F7CC06EA-8135-4DC5-BA0A-28CCC05DEFA0}" type="datetime1">
               <a:rPr lang="en-GB" smtClean="0"/>
-              <a:t>06/05/2020</a:t>
+              <a:t>07/05/2020</a:t>
             </a:fld>
             <a:endParaRPr lang="en-GB"/>
           </a:p>
@@ -4238,7 +4253,7 @@
           <a:p>
             <a:fld id="{BFB38DAA-A929-4F83-90EF-F41A94A7AEBF}" type="datetime1">
               <a:rPr lang="en-GB" smtClean="0"/>
-              <a:t>06/05/2020</a:t>
+              <a:t>07/05/2020</a:t>
             </a:fld>
             <a:endParaRPr lang="en-GB"/>
           </a:p>
@@ -4527,7 +4542,7 @@
           <a:p>
             <a:fld id="{A5C3BC09-303C-492E-88C1-49700F40A5AD}" type="datetime1">
               <a:rPr lang="en-GB" smtClean="0"/>
-              <a:t>06/05/2020</a:t>
+              <a:t>07/05/2020</a:t>
             </a:fld>
             <a:endParaRPr lang="en-GB"/>
           </a:p>
@@ -4780,7 +4795,7 @@
           <a:p>
             <a:fld id="{81F60144-7850-46D0-A9C3-9B5CC4C07D04}" type="datetime1">
               <a:rPr lang="en-GB" smtClean="0"/>
-              <a:t>06/05/2020</a:t>
+              <a:t>07/05/2020</a:t>
             </a:fld>
             <a:endParaRPr lang="en-GB"/>
           </a:p>
@@ -5663,15 +5678,17 @@
             <a:r>
               <a:rPr lang="en-GB" sz="2800" b="1" dirty="0">
                 <a:solidFill>
-                  <a:schemeClr val="tx2">
-                    <a:lumMod val="75000"/>
-                  </a:schemeClr>
+                  <a:schemeClr val="accent4"/>
                 </a:solidFill>
                 <a:latin typeface="Arial Nova Light" panose="020B0304020202020204" pitchFamily="34" charset="0"/>
               </a:rPr>
               <a:t>&lt;key concept&gt;</a:t>
             </a:r>
-            <a:endParaRPr lang="en-GB" dirty="0"/>
+            <a:endParaRPr lang="en-GB" b="1" dirty="0">
+              <a:solidFill>
+                <a:schemeClr val="accent4"/>
+              </a:solidFill>
+            </a:endParaRPr>
           </a:p>
         </p:txBody>
       </p:sp>

</xml_diff>